<commit_message>
Add sections to the more info page of the site.
</commit_message>
<xml_diff>
--- a/Protyping of website.pptx
+++ b/Protyping of website.pptx
@@ -105,6 +105,11 @@
       </a:defRPr>
     </a:lvl9pPr>
   </p:defaultTextStyle>
+  <p:extLst>
+    <p:ext uri="{EFAFB233-063F-42B5-8137-9DF3F51BA10A}">
+      <p15:sldGuideLst xmlns:p15="http://schemas.microsoft.com/office/powerpoint/2012/main"/>
+    </p:ext>
+  </p:extLst>
 </p:presentation>
 </file>
 
@@ -255,7 +260,7 @@
           <a:p>
             <a:fld id="{349DEDEE-9A7E-450C-BBEC-328772541CDE}" type="datetimeFigureOut">
               <a:rPr lang="en-US" smtClean="0"/>
-              <a:t>5/1/2022</a:t>
+              <a:t>6/24/2022</a:t>
             </a:fld>
             <a:endParaRPr lang="en-US"/>
           </a:p>
@@ -453,7 +458,7 @@
           <a:p>
             <a:fld id="{349DEDEE-9A7E-450C-BBEC-328772541CDE}" type="datetimeFigureOut">
               <a:rPr lang="en-US" smtClean="0"/>
-              <a:t>5/1/2022</a:t>
+              <a:t>6/24/2022</a:t>
             </a:fld>
             <a:endParaRPr lang="en-US"/>
           </a:p>
@@ -661,7 +666,7 @@
           <a:p>
             <a:fld id="{349DEDEE-9A7E-450C-BBEC-328772541CDE}" type="datetimeFigureOut">
               <a:rPr lang="en-US" smtClean="0"/>
-              <a:t>5/1/2022</a:t>
+              <a:t>6/24/2022</a:t>
             </a:fld>
             <a:endParaRPr lang="en-US"/>
           </a:p>
@@ -859,7 +864,7 @@
           <a:p>
             <a:fld id="{349DEDEE-9A7E-450C-BBEC-328772541CDE}" type="datetimeFigureOut">
               <a:rPr lang="en-US" smtClean="0"/>
-              <a:t>5/1/2022</a:t>
+              <a:t>6/24/2022</a:t>
             </a:fld>
             <a:endParaRPr lang="en-US"/>
           </a:p>
@@ -1134,7 +1139,7 @@
           <a:p>
             <a:fld id="{349DEDEE-9A7E-450C-BBEC-328772541CDE}" type="datetimeFigureOut">
               <a:rPr lang="en-US" smtClean="0"/>
-              <a:t>5/1/2022</a:t>
+              <a:t>6/24/2022</a:t>
             </a:fld>
             <a:endParaRPr lang="en-US"/>
           </a:p>
@@ -1399,7 +1404,7 @@
           <a:p>
             <a:fld id="{349DEDEE-9A7E-450C-BBEC-328772541CDE}" type="datetimeFigureOut">
               <a:rPr lang="en-US" smtClean="0"/>
-              <a:t>5/1/2022</a:t>
+              <a:t>6/24/2022</a:t>
             </a:fld>
             <a:endParaRPr lang="en-US"/>
           </a:p>
@@ -1811,7 +1816,7 @@
           <a:p>
             <a:fld id="{349DEDEE-9A7E-450C-BBEC-328772541CDE}" type="datetimeFigureOut">
               <a:rPr lang="en-US" smtClean="0"/>
-              <a:t>5/1/2022</a:t>
+              <a:t>6/24/2022</a:t>
             </a:fld>
             <a:endParaRPr lang="en-US"/>
           </a:p>
@@ -1952,7 +1957,7 @@
           <a:p>
             <a:fld id="{349DEDEE-9A7E-450C-BBEC-328772541CDE}" type="datetimeFigureOut">
               <a:rPr lang="en-US" smtClean="0"/>
-              <a:t>5/1/2022</a:t>
+              <a:t>6/24/2022</a:t>
             </a:fld>
             <a:endParaRPr lang="en-US"/>
           </a:p>
@@ -2065,7 +2070,7 @@
           <a:p>
             <a:fld id="{349DEDEE-9A7E-450C-BBEC-328772541CDE}" type="datetimeFigureOut">
               <a:rPr lang="en-US" smtClean="0"/>
-              <a:t>5/1/2022</a:t>
+              <a:t>6/24/2022</a:t>
             </a:fld>
             <a:endParaRPr lang="en-US"/>
           </a:p>
@@ -2376,7 +2381,7 @@
           <a:p>
             <a:fld id="{349DEDEE-9A7E-450C-BBEC-328772541CDE}" type="datetimeFigureOut">
               <a:rPr lang="en-US" smtClean="0"/>
-              <a:t>5/1/2022</a:t>
+              <a:t>6/24/2022</a:t>
             </a:fld>
             <a:endParaRPr lang="en-US"/>
           </a:p>
@@ -2664,7 +2669,7 @@
           <a:p>
             <a:fld id="{349DEDEE-9A7E-450C-BBEC-328772541CDE}" type="datetimeFigureOut">
               <a:rPr lang="en-US" smtClean="0"/>
-              <a:t>5/1/2022</a:t>
+              <a:t>6/24/2022</a:t>
             </a:fld>
             <a:endParaRPr lang="en-US"/>
           </a:p>
@@ -2905,7 +2910,7 @@
           <a:p>
             <a:fld id="{349DEDEE-9A7E-450C-BBEC-328772541CDE}" type="datetimeFigureOut">
               <a:rPr lang="en-US" smtClean="0"/>
-              <a:t>5/1/2022</a:t>
+              <a:t>6/24/2022</a:t>
             </a:fld>
             <a:endParaRPr lang="en-US"/>
           </a:p>
@@ -3456,55 +3461,6 @@
           </a:p>
         </p:txBody>
       </p:sp>
-      <p:sp>
-        <p:nvSpPr>
-          <p:cNvPr id="7" name="Rectangle 6">
-            <a:extLst>
-              <a:ext uri="{FF2B5EF4-FFF2-40B4-BE49-F238E27FC236}">
-                <a16:creationId xmlns:a16="http://schemas.microsoft.com/office/drawing/2014/main" id="{96F50898-4C1A-4EE8-9946-A6B8B9839DA6}"/>
-              </a:ext>
-            </a:extLst>
-          </p:cNvPr>
-          <p:cNvSpPr/>
-          <p:nvPr/>
-        </p:nvSpPr>
-        <p:spPr>
-          <a:xfrm>
-            <a:off x="8545286" y="1548883"/>
-            <a:ext cx="2621902" cy="4058816"/>
-          </a:xfrm>
-          <a:prstGeom prst="rect">
-            <a:avLst/>
-          </a:prstGeom>
-          <a:solidFill>
-            <a:schemeClr val="bg2"/>
-          </a:solidFill>
-        </p:spPr>
-        <p:style>
-          <a:lnRef idx="2">
-            <a:schemeClr val="accent1">
-              <a:shade val="50000"/>
-            </a:schemeClr>
-          </a:lnRef>
-          <a:fillRef idx="1">
-            <a:schemeClr val="accent1"/>
-          </a:fillRef>
-          <a:effectRef idx="0">
-            <a:schemeClr val="accent1"/>
-          </a:effectRef>
-          <a:fontRef idx="minor">
-            <a:schemeClr val="lt1"/>
-          </a:fontRef>
-        </p:style>
-        <p:txBody>
-          <a:bodyPr rtlCol="0" anchor="ctr"/>
-          <a:lstStyle/>
-          <a:p>
-            <a:pPr algn="ctr"/>
-            <a:endParaRPr lang="en-US"/>
-          </a:p>
-        </p:txBody>
-      </p:sp>
       <p:grpSp>
         <p:nvGrpSpPr>
           <p:cNvPr id="12" name="Group 11">
@@ -3589,8 +3545,8 @@
           </p:nvSpPr>
           <p:spPr>
             <a:xfrm>
-              <a:off x="1539551" y="2218553"/>
-              <a:ext cx="1390261" cy="923330"/>
+              <a:off x="1595534" y="2224332"/>
+              <a:ext cx="1390261" cy="1018519"/>
             </a:xfrm>
             <a:prstGeom prst="rect">
               <a:avLst/>
@@ -3771,6 +3727,7 @@
       <p:sp>
         <p:nvSpPr>
           <p:cNvPr id="16" name="Rectangle 15">
+            <a:hlinkClick r:id="rId2" action="ppaction://hlinksldjump"/>
             <a:extLst>
               <a:ext uri="{FF2B5EF4-FFF2-40B4-BE49-F238E27FC236}">
                 <a16:creationId xmlns:a16="http://schemas.microsoft.com/office/drawing/2014/main" id="{E005A488-05A3-490E-979F-821E35D48E1D}"/>
@@ -3888,6 +3845,108 @@
               <a:rPr lang="en-US" dirty="0"/>
               <a:t>Plant Name</a:t>
             </a:r>
+          </a:p>
+        </p:txBody>
+      </p:sp>
+      <p:sp>
+        <p:nvSpPr>
+          <p:cNvPr id="2" name="Oval 1">
+            <a:extLst>
+              <a:ext uri="{FF2B5EF4-FFF2-40B4-BE49-F238E27FC236}">
+                <a16:creationId xmlns:a16="http://schemas.microsoft.com/office/drawing/2014/main" id="{44BC48E6-161B-2907-60CF-95D1A9DB64C4}"/>
+              </a:ext>
+            </a:extLst>
+          </p:cNvPr>
+          <p:cNvSpPr/>
+          <p:nvPr/>
+        </p:nvSpPr>
+        <p:spPr>
+          <a:xfrm>
+            <a:off x="5695949" y="3034719"/>
+            <a:ext cx="800100" cy="787981"/>
+          </a:xfrm>
+          <a:prstGeom prst="ellipse">
+            <a:avLst/>
+          </a:prstGeom>
+          <a:solidFill>
+            <a:schemeClr val="bg1"/>
+          </a:solidFill>
+          <a:ln>
+            <a:solidFill>
+              <a:schemeClr val="bg1">
+                <a:lumMod val="85000"/>
+              </a:schemeClr>
+            </a:solidFill>
+          </a:ln>
+        </p:spPr>
+        <p:style>
+          <a:lnRef idx="2">
+            <a:schemeClr val="accent1">
+              <a:shade val="50000"/>
+            </a:schemeClr>
+          </a:lnRef>
+          <a:fillRef idx="1">
+            <a:schemeClr val="accent1"/>
+          </a:fillRef>
+          <a:effectRef idx="0">
+            <a:schemeClr val="accent1"/>
+          </a:effectRef>
+          <a:fontRef idx="minor">
+            <a:schemeClr val="lt1"/>
+          </a:fontRef>
+        </p:style>
+        <p:txBody>
+          <a:bodyPr rtlCol="0" anchor="ctr"/>
+          <a:lstStyle/>
+          <a:p>
+            <a:pPr algn="ctr"/>
+            <a:endParaRPr lang="en-US"/>
+          </a:p>
+        </p:txBody>
+      </p:sp>
+      <p:sp>
+        <p:nvSpPr>
+          <p:cNvPr id="3" name="Plus Sign 2">
+            <a:extLst>
+              <a:ext uri="{FF2B5EF4-FFF2-40B4-BE49-F238E27FC236}">
+                <a16:creationId xmlns:a16="http://schemas.microsoft.com/office/drawing/2014/main" id="{537AE8F3-2DD5-9CF1-7E7D-FA535D7F730B}"/>
+              </a:ext>
+            </a:extLst>
+          </p:cNvPr>
+          <p:cNvSpPr/>
+          <p:nvPr/>
+        </p:nvSpPr>
+        <p:spPr>
+          <a:xfrm>
+            <a:off x="5924549" y="3247410"/>
+            <a:ext cx="342900" cy="362598"/>
+          </a:xfrm>
+          <a:prstGeom prst="mathPlus">
+            <a:avLst/>
+          </a:prstGeom>
+        </p:spPr>
+        <p:style>
+          <a:lnRef idx="2">
+            <a:schemeClr val="accent1">
+              <a:shade val="50000"/>
+            </a:schemeClr>
+          </a:lnRef>
+          <a:fillRef idx="1">
+            <a:schemeClr val="accent1"/>
+          </a:fillRef>
+          <a:effectRef idx="0">
+            <a:schemeClr val="accent1"/>
+          </a:effectRef>
+          <a:fontRef idx="minor">
+            <a:schemeClr val="lt1"/>
+          </a:fontRef>
+        </p:style>
+        <p:txBody>
+          <a:bodyPr rtlCol="0" anchor="ctr"/>
+          <a:lstStyle/>
+          <a:p>
+            <a:pPr algn="ctr"/>
+            <a:endParaRPr lang="en-US"/>
           </a:p>
         </p:txBody>
       </p:sp>
@@ -3970,7 +4029,7 @@
         </p:nvSpPr>
         <p:spPr>
           <a:xfrm>
-            <a:off x="242596" y="989042"/>
+            <a:off x="162121" y="601824"/>
             <a:ext cx="3237724" cy="5654351"/>
           </a:xfrm>
           <a:prstGeom prst="rect">
@@ -4016,7 +4075,7 @@
         </p:nvSpPr>
         <p:spPr>
           <a:xfrm>
-            <a:off x="853752" y="989042"/>
+            <a:off x="803016" y="601824"/>
             <a:ext cx="2015412" cy="369332"/>
           </a:xfrm>
           <a:prstGeom prst="rect">
@@ -4052,7 +4111,7 @@
         </p:nvSpPr>
         <p:spPr>
           <a:xfrm>
-            <a:off x="4198777" y="989042"/>
+            <a:off x="4252427" y="601824"/>
             <a:ext cx="3237724" cy="5654351"/>
           </a:xfrm>
           <a:prstGeom prst="rect">
@@ -4098,8 +4157,8 @@
         </p:nvSpPr>
         <p:spPr>
           <a:xfrm>
-            <a:off x="4091476" y="989043"/>
-            <a:ext cx="3452326" cy="369332"/>
+            <a:off x="4252425" y="601824"/>
+            <a:ext cx="3237725" cy="369332"/>
           </a:xfrm>
           <a:prstGeom prst="rect">
             <a:avLst/>
@@ -4134,7 +4193,7 @@
         </p:nvSpPr>
         <p:spPr>
           <a:xfrm>
-            <a:off x="8154958" y="989042"/>
+            <a:off x="8262260" y="601824"/>
             <a:ext cx="3237724" cy="5654351"/>
           </a:xfrm>
           <a:prstGeom prst="rect">
@@ -4180,7 +4239,7 @@
         </p:nvSpPr>
         <p:spPr>
           <a:xfrm>
-            <a:off x="8710130" y="989042"/>
+            <a:off x="8817432" y="601824"/>
             <a:ext cx="2127380" cy="369332"/>
           </a:xfrm>
           <a:prstGeom prst="rect">
@@ -4216,7 +4275,7 @@
         </p:nvSpPr>
         <p:spPr>
           <a:xfrm>
-            <a:off x="8154958" y="1595535"/>
+            <a:off x="8262260" y="1208317"/>
             <a:ext cx="3237724" cy="369332"/>
           </a:xfrm>
           <a:prstGeom prst="rect">
@@ -4278,7 +4337,7 @@
         </p:blipFill>
         <p:spPr>
           <a:xfrm>
-            <a:off x="8154957" y="3807717"/>
+            <a:off x="8262259" y="2364682"/>
             <a:ext cx="3237724" cy="2068044"/>
           </a:xfrm>
           <a:prstGeom prst="rect">
@@ -4300,7 +4359,7 @@
         </p:nvSpPr>
         <p:spPr>
           <a:xfrm>
-            <a:off x="8154957" y="2382568"/>
+            <a:off x="8262259" y="1995350"/>
             <a:ext cx="3237724" cy="369332"/>
           </a:xfrm>
           <a:prstGeom prst="rect">
@@ -4336,6 +4395,93 @@
             <a:r>
               <a:rPr lang="en-US" dirty="0"/>
               <a:t>Signal Strength</a:t>
+            </a:r>
+          </a:p>
+        </p:txBody>
+      </p:sp>
+      <p:sp>
+        <p:nvSpPr>
+          <p:cNvPr id="2" name="TextBox 1">
+            <a:extLst>
+              <a:ext uri="{FF2B5EF4-FFF2-40B4-BE49-F238E27FC236}">
+                <a16:creationId xmlns:a16="http://schemas.microsoft.com/office/drawing/2014/main" id="{D991D873-1E05-D70F-B6AA-2A01E525AE6A}"/>
+              </a:ext>
+            </a:extLst>
+          </p:cNvPr>
+          <p:cNvSpPr txBox="1"/>
+          <p:nvPr/>
+        </p:nvSpPr>
+        <p:spPr>
+          <a:xfrm>
+            <a:off x="8262259" y="1577649"/>
+            <a:ext cx="3237724" cy="369332"/>
+          </a:xfrm>
+          <a:prstGeom prst="rect">
+            <a:avLst/>
+          </a:prstGeom>
+          <a:noFill/>
+        </p:spPr>
+        <p:txBody>
+          <a:bodyPr wrap="square" rtlCol="0">
+            <a:spAutoFit/>
+          </a:bodyPr>
+          <a:lstStyle/>
+          <a:p>
+            <a:pPr algn="ctr"/>
+            <a:r>
+              <a:rPr lang="en-US" dirty="0"/>
+              <a:t>129.xxx.xxx.xxx</a:t>
+            </a:r>
+          </a:p>
+        </p:txBody>
+      </p:sp>
+      <p:sp>
+        <p:nvSpPr>
+          <p:cNvPr id="13" name="Rectangle 12">
+            <a:extLst>
+              <a:ext uri="{FF2B5EF4-FFF2-40B4-BE49-F238E27FC236}">
+                <a16:creationId xmlns:a16="http://schemas.microsoft.com/office/drawing/2014/main" id="{E0ADB040-4DC5-53E5-DED2-4887A5E2BDA0}"/>
+              </a:ext>
+            </a:extLst>
+          </p:cNvPr>
+          <p:cNvSpPr/>
+          <p:nvPr/>
+        </p:nvSpPr>
+        <p:spPr>
+          <a:xfrm>
+            <a:off x="8262259" y="5886843"/>
+            <a:ext cx="3237724" cy="369332"/>
+          </a:xfrm>
+          <a:prstGeom prst="rect">
+            <a:avLst/>
+          </a:prstGeom>
+          <a:solidFill>
+            <a:schemeClr val="accent6"/>
+          </a:solidFill>
+          <a:effectLst/>
+        </p:spPr>
+        <p:style>
+          <a:lnRef idx="2">
+            <a:schemeClr val="accent6"/>
+          </a:lnRef>
+          <a:fillRef idx="1">
+            <a:schemeClr val="lt1"/>
+          </a:fillRef>
+          <a:effectRef idx="0">
+            <a:schemeClr val="accent6"/>
+          </a:effectRef>
+          <a:fontRef idx="minor">
+            <a:schemeClr val="dk1"/>
+          </a:fontRef>
+        </p:style>
+        <p:txBody>
+          <a:bodyPr rtlCol="0" anchor="ctr"/>
+          <a:lstStyle/>
+          <a:p>
+            <a:pPr algn="ctr"/>
+            <a:r>
+              <a:rPr lang="en-US" dirty="0"/>
+              <a:t>Connected</a:t>
             </a:r>
           </a:p>
         </p:txBody>

</xml_diff>

<commit_message>
Completed prototyping the website in powerpoint.
</commit_message>
<xml_diff>
--- a/Protyping of website.pptx
+++ b/Protyping of website.pptx
@@ -7,6 +7,10 @@
   <p:sldIdLst>
     <p:sldId id="256" r:id="rId2"/>
     <p:sldId id="257" r:id="rId3"/>
+    <p:sldId id="258" r:id="rId4"/>
+    <p:sldId id="259" r:id="rId5"/>
+    <p:sldId id="260" r:id="rId6"/>
+    <p:sldId id="261" r:id="rId7"/>
   </p:sldIdLst>
   <p:sldSz cx="12192000" cy="6858000"/>
   <p:notesSz cx="6858000" cy="9144000"/>
@@ -111,6 +115,73 @@
     </p:ext>
   </p:extLst>
 </p:presentation>
+</file>
+
+<file path=ppt/authors.xml><?xml version="1.0" encoding="utf-8"?>
+<p188:authorLst xmlns:a="http://schemas.openxmlformats.org/drawingml/2006/main" xmlns:r="http://schemas.openxmlformats.org/officeDocument/2006/relationships" xmlns:p188="http://schemas.microsoft.com/office/powerpoint/2018/8/main">
+  <p188:author id="{70B1F16F-8A5C-4D85-160B-FF9EF324FB8E}" name="Eric Washington" initials="EW" userId="556a07a29e8b0259" providerId="Windows Live"/>
+</p188:authorLst>
+</file>
+
+<file path=ppt/comments/modernComment_101_9609510C.xml><?xml version="1.0" encoding="utf-8"?>
+<p188:cmLst xmlns:a="http://schemas.openxmlformats.org/drawingml/2006/main" xmlns:r="http://schemas.openxmlformats.org/officeDocument/2006/relationships" xmlns:p188="http://schemas.microsoft.com/office/powerpoint/2018/8/main">
+  <p188:cm id="{D765C6D3-EAF3-4B9A-A793-B6CC48F74903}" authorId="{70B1F16F-8A5C-4D85-160B-FF9EF324FB8E}" created="2022-06-24T21:16:34.108">
+    <ac:deMkLst xmlns:ac="http://schemas.microsoft.com/office/drawing/2013/main/command">
+      <pc:docMk xmlns:pc="http://schemas.microsoft.com/office/powerpoint/2013/main/command"/>
+      <pc:sldMk xmlns:pc="http://schemas.microsoft.com/office/powerpoint/2013/main/command" cId="2517192972" sldId="257"/>
+      <ac:spMk id="23" creationId="{2455C459-1806-530B-CF53-87B454032216}"/>
+    </ac:deMkLst>
+    <p188:txBody>
+      <a:bodyPr/>
+      <a:lstStyle/>
+      <a:p>
+        <a:r>
+          <a:rPr lang="en-US"/>
+          <a:t>This will change color as the water level changes. As it gets closer to the dry voltage it will turn red. As it gets closer to the wet voltage it will turn green. </a:t>
+        </a:r>
+      </a:p>
+    </p188:txBody>
+  </p188:cm>
+  <p188:cm id="{AB3BD304-60CA-4CEA-B00D-2597530647E8}" authorId="{70B1F16F-8A5C-4D85-160B-FF9EF324FB8E}" created="2022-06-24T22:26:12.500">
+    <ac:deMkLst xmlns:ac="http://schemas.microsoft.com/office/drawing/2013/main/command">
+      <pc:docMk xmlns:pc="http://schemas.microsoft.com/office/powerpoint/2013/main/command"/>
+      <pc:sldMk xmlns:pc="http://schemas.microsoft.com/office/powerpoint/2013/main/command" cId="2517192972" sldId="257"/>
+      <ac:spMk id="13" creationId="{E0ADB040-4DC5-53E5-DED2-4887A5E2BDA0}"/>
+    </ac:deMkLst>
+    <p188:txBody>
+      <a:bodyPr/>
+      <a:lstStyle/>
+      <a:p>
+        <a:r>
+          <a:rPr lang="en-US"/>
+          <a:t>Color will change as well as text, to disconnected, if the device disconnects. </a:t>
+        </a:r>
+      </a:p>
+    </p188:txBody>
+  </p188:cm>
+</p188:cmLst>
+</file>
+
+<file path=ppt/comments/modernComment_105_E311B3E6.xml><?xml version="1.0" encoding="utf-8"?>
+<p188:cmLst xmlns:a="http://schemas.openxmlformats.org/drawingml/2006/main" xmlns:r="http://schemas.openxmlformats.org/officeDocument/2006/relationships" xmlns:p188="http://schemas.microsoft.com/office/powerpoint/2018/8/main">
+  <p188:cm id="{FF9A2CBE-3C20-4E01-842D-3BC49030D4E9}" authorId="{70B1F16F-8A5C-4D85-160B-FF9EF324FB8E}" created="2022-06-24T23:41:48.954">
+    <ac:deMkLst xmlns:ac="http://schemas.microsoft.com/office/drawing/2013/main/command">
+      <pc:docMk xmlns:pc="http://schemas.microsoft.com/office/powerpoint/2013/main/command"/>
+      <pc:sldMk xmlns:pc="http://schemas.microsoft.com/office/powerpoint/2013/main/command" cId="3809588198" sldId="261"/>
+      <ac:spMk id="16" creationId="{71AC2D43-AB9A-34B3-1A0C-1E900F9DF8A2}"/>
+    </ac:deMkLst>
+    <p188:txBody>
+      <a:bodyPr/>
+      <a:lstStyle/>
+      <a:p>
+        <a:r>
+          <a:rPr lang="en-US"/>
+          <a:t>When this button is pressed it will check to make sure that there is actually a sensor with the IP address. Once that is verified it will then start pulling the data from the database. </a:t>
+        </a:r>
+      </a:p>
+    </p188:txBody>
+  </p188:cm>
+</p188:cmLst>
 </file>
 
 <file path=ppt/slideLayouts/slideLayout1.xml><?xml version="1.0" encoding="utf-8"?>
@@ -3480,6 +3551,9 @@
             <a:chOff x="1418253" y="1931437"/>
             <a:chExt cx="1744825" cy="1497563"/>
           </a:xfrm>
+          <a:solidFill>
+            <a:schemeClr val="bg1"/>
+          </a:solidFill>
         </p:grpSpPr>
         <p:sp>
           <p:nvSpPr>
@@ -3501,6 +3575,7 @@
             <a:prstGeom prst="rect">
               <a:avLst/>
             </a:prstGeom>
+            <a:grpFill/>
           </p:spPr>
           <p:style>
             <a:lnRef idx="2">
@@ -3551,7 +3626,7 @@
             <a:prstGeom prst="rect">
               <a:avLst/>
             </a:prstGeom>
-            <a:noFill/>
+            <a:grpFill/>
           </p:spPr>
           <p:txBody>
             <a:bodyPr wrap="square" rtlCol="0">
@@ -3571,6 +3646,7 @@
       <p:sp>
         <p:nvSpPr>
           <p:cNvPr id="13" name="Rectangle 12">
+            <a:hlinkClick r:id="rId2" action="ppaction://hlinksldjump"/>
             <a:extLst>
               <a:ext uri="{FF2B5EF4-FFF2-40B4-BE49-F238E27FC236}">
                 <a16:creationId xmlns:a16="http://schemas.microsoft.com/office/drawing/2014/main" id="{652214B7-BD42-432B-ADF5-73B780C97642}"/>
@@ -3623,6 +3699,7 @@
       <p:sp>
         <p:nvSpPr>
           <p:cNvPr id="14" name="Rectangle 13">
+            <a:hlinkClick r:id="rId3" action="ppaction://hlinksldjump"/>
             <a:extLst>
               <a:ext uri="{FF2B5EF4-FFF2-40B4-BE49-F238E27FC236}">
                 <a16:creationId xmlns:a16="http://schemas.microsoft.com/office/drawing/2014/main" id="{424C8689-1EEA-4A29-903B-E2BE807380C2}"/>
@@ -3675,6 +3752,7 @@
       <p:sp>
         <p:nvSpPr>
           <p:cNvPr id="15" name="Rectangle 14">
+            <a:hlinkClick r:id="rId4" action="ppaction://hlinksldjump"/>
             <a:extLst>
               <a:ext uri="{FF2B5EF4-FFF2-40B4-BE49-F238E27FC236}">
                 <a16:creationId xmlns:a16="http://schemas.microsoft.com/office/drawing/2014/main" id="{80DBFCFD-4C5B-4C97-8AF2-EB77D54DF65C}"/>
@@ -3727,7 +3805,7 @@
       <p:sp>
         <p:nvSpPr>
           <p:cNvPr id="16" name="Rectangle 15">
-            <a:hlinkClick r:id="rId2" action="ppaction://hlinksldjump"/>
+            <a:hlinkClick r:id="rId5" action="ppaction://hlinksldjump"/>
             <a:extLst>
               <a:ext uri="{FF2B5EF4-FFF2-40B4-BE49-F238E27FC236}">
                 <a16:creationId xmlns:a16="http://schemas.microsoft.com/office/drawing/2014/main" id="{E005A488-05A3-490E-979F-821E35D48E1D}"/>
@@ -3848,36 +3926,157 @@
           </a:p>
         </p:txBody>
       </p:sp>
-      <p:sp>
-        <p:nvSpPr>
-          <p:cNvPr id="2" name="Oval 1">
-            <a:extLst>
-              <a:ext uri="{FF2B5EF4-FFF2-40B4-BE49-F238E27FC236}">
-                <a16:creationId xmlns:a16="http://schemas.microsoft.com/office/drawing/2014/main" id="{44BC48E6-161B-2907-60CF-95D1A9DB64C4}"/>
-              </a:ext>
-            </a:extLst>
-          </p:cNvPr>
-          <p:cNvSpPr/>
-          <p:nvPr/>
-        </p:nvSpPr>
-        <p:spPr>
+      <p:grpSp>
+        <p:nvGrpSpPr>
+          <p:cNvPr id="7" name="Group 6">
+            <a:extLst>
+              <a:ext uri="{FF2B5EF4-FFF2-40B4-BE49-F238E27FC236}">
+                <a16:creationId xmlns:a16="http://schemas.microsoft.com/office/drawing/2014/main" id="{5997652B-E6CA-6811-9B40-2AA3E2E5595D}"/>
+              </a:ext>
+            </a:extLst>
+          </p:cNvPr>
+          <p:cNvGrpSpPr/>
+          <p:nvPr/>
+        </p:nvGrpSpPr>
+        <p:grpSpPr>
           <a:xfrm>
             <a:off x="5695949" y="3034719"/>
             <a:ext cx="800100" cy="787981"/>
-          </a:xfrm>
-          <a:prstGeom prst="ellipse">
-            <a:avLst/>
-          </a:prstGeom>
-          <a:solidFill>
-            <a:schemeClr val="bg1"/>
-          </a:solidFill>
-          <a:ln>
+            <a:chOff x="5695949" y="3034719"/>
+            <a:chExt cx="800100" cy="787981"/>
+          </a:xfrm>
+        </p:grpSpPr>
+        <p:sp>
+          <p:nvSpPr>
+            <p:cNvPr id="2" name="Oval 1">
+              <a:hlinkClick r:id="rId6" action="ppaction://hlinksldjump"/>
+              <a:extLst>
+                <a:ext uri="{FF2B5EF4-FFF2-40B4-BE49-F238E27FC236}">
+                  <a16:creationId xmlns:a16="http://schemas.microsoft.com/office/drawing/2014/main" id="{44BC48E6-161B-2907-60CF-95D1A9DB64C4}"/>
+                </a:ext>
+              </a:extLst>
+            </p:cNvPr>
+            <p:cNvSpPr/>
+            <p:nvPr/>
+          </p:nvSpPr>
+          <p:spPr>
+            <a:xfrm>
+              <a:off x="5695949" y="3034719"/>
+              <a:ext cx="800100" cy="787981"/>
+            </a:xfrm>
+            <a:prstGeom prst="ellipse">
+              <a:avLst/>
+            </a:prstGeom>
             <a:solidFill>
-              <a:schemeClr val="bg1">
-                <a:lumMod val="85000"/>
+              <a:schemeClr val="bg1"/>
+            </a:solidFill>
+            <a:ln>
+              <a:solidFill>
+                <a:schemeClr val="bg1">
+                  <a:lumMod val="85000"/>
+                </a:schemeClr>
+              </a:solidFill>
+            </a:ln>
+          </p:spPr>
+          <p:style>
+            <a:lnRef idx="2">
+              <a:schemeClr val="accent1">
+                <a:shade val="50000"/>
               </a:schemeClr>
-            </a:solidFill>
-          </a:ln>
+            </a:lnRef>
+            <a:fillRef idx="1">
+              <a:schemeClr val="accent1"/>
+            </a:fillRef>
+            <a:effectRef idx="0">
+              <a:schemeClr val="accent1"/>
+            </a:effectRef>
+            <a:fontRef idx="minor">
+              <a:schemeClr val="lt1"/>
+            </a:fontRef>
+          </p:style>
+          <p:txBody>
+            <a:bodyPr rtlCol="0" anchor="ctr"/>
+            <a:lstStyle/>
+            <a:p>
+              <a:pPr algn="ctr"/>
+              <a:endParaRPr lang="en-US"/>
+            </a:p>
+          </p:txBody>
+        </p:sp>
+        <p:sp>
+          <p:nvSpPr>
+            <p:cNvPr id="3" name="Plus Sign 2">
+              <a:extLst>
+                <a:ext uri="{FF2B5EF4-FFF2-40B4-BE49-F238E27FC236}">
+                  <a16:creationId xmlns:a16="http://schemas.microsoft.com/office/drawing/2014/main" id="{537AE8F3-2DD5-9CF1-7E7D-FA535D7F730B}"/>
+                </a:ext>
+              </a:extLst>
+            </p:cNvPr>
+            <p:cNvSpPr/>
+            <p:nvPr/>
+          </p:nvSpPr>
+          <p:spPr>
+            <a:xfrm>
+              <a:off x="5924549" y="3247410"/>
+              <a:ext cx="342900" cy="362598"/>
+            </a:xfrm>
+            <a:prstGeom prst="mathPlus">
+              <a:avLst/>
+            </a:prstGeom>
+          </p:spPr>
+          <p:style>
+            <a:lnRef idx="2">
+              <a:schemeClr val="accent1">
+                <a:shade val="50000"/>
+              </a:schemeClr>
+            </a:lnRef>
+            <a:fillRef idx="1">
+              <a:schemeClr val="accent1"/>
+            </a:fillRef>
+            <a:effectRef idx="0">
+              <a:schemeClr val="accent1"/>
+            </a:effectRef>
+            <a:fontRef idx="minor">
+              <a:schemeClr val="lt1"/>
+            </a:fontRef>
+          </p:style>
+          <p:txBody>
+            <a:bodyPr rtlCol="0" anchor="ctr"/>
+            <a:lstStyle/>
+            <a:p>
+              <a:pPr algn="ctr"/>
+              <a:endParaRPr lang="en-US"/>
+            </a:p>
+          </p:txBody>
+        </p:sp>
+      </p:grpSp>
+      <p:sp>
+        <p:nvSpPr>
+          <p:cNvPr id="10" name="Rectangle 9">
+            <a:extLst>
+              <a:ext uri="{FF2B5EF4-FFF2-40B4-BE49-F238E27FC236}">
+                <a16:creationId xmlns:a16="http://schemas.microsoft.com/office/drawing/2014/main" id="{BF64D2FD-3987-0138-0312-1C59302B6F48}"/>
+              </a:ext>
+            </a:extLst>
+          </p:cNvPr>
+          <p:cNvSpPr/>
+          <p:nvPr/>
+        </p:nvSpPr>
+        <p:spPr>
+          <a:xfrm>
+            <a:off x="1714653" y="3307702"/>
+            <a:ext cx="1242215" cy="265522"/>
+          </a:xfrm>
+          <a:prstGeom prst="rect">
+            <a:avLst/>
+          </a:prstGeom>
+          <a:scene3d>
+            <a:camera prst="orthographicFront"/>
+            <a:lightRig rig="threePt" dir="t"/>
+          </a:scene3d>
+          <a:sp3d>
+            <a:bevelT/>
+          </a:sp3d>
         </p:spPr>
         <p:style>
           <a:lnRef idx="2">
@@ -3900,53 +4099,10 @@
           <a:lstStyle/>
           <a:p>
             <a:pPr algn="ctr"/>
-            <a:endParaRPr lang="en-US"/>
-          </a:p>
-        </p:txBody>
-      </p:sp>
-      <p:sp>
-        <p:nvSpPr>
-          <p:cNvPr id="3" name="Plus Sign 2">
-            <a:extLst>
-              <a:ext uri="{FF2B5EF4-FFF2-40B4-BE49-F238E27FC236}">
-                <a16:creationId xmlns:a16="http://schemas.microsoft.com/office/drawing/2014/main" id="{537AE8F3-2DD5-9CF1-7E7D-FA535D7F730B}"/>
-              </a:ext>
-            </a:extLst>
-          </p:cNvPr>
-          <p:cNvSpPr/>
-          <p:nvPr/>
-        </p:nvSpPr>
-        <p:spPr>
-          <a:xfrm>
-            <a:off x="5924549" y="3247410"/>
-            <a:ext cx="342900" cy="362598"/>
-          </a:xfrm>
-          <a:prstGeom prst="mathPlus">
-            <a:avLst/>
-          </a:prstGeom>
-        </p:spPr>
-        <p:style>
-          <a:lnRef idx="2">
-            <a:schemeClr val="accent1">
-              <a:shade val="50000"/>
-            </a:schemeClr>
-          </a:lnRef>
-          <a:fillRef idx="1">
-            <a:schemeClr val="accent1"/>
-          </a:fillRef>
-          <a:effectRef idx="0">
-            <a:schemeClr val="accent1"/>
-          </a:effectRef>
-          <a:fontRef idx="minor">
-            <a:schemeClr val="lt1"/>
-          </a:fontRef>
-        </p:style>
-        <p:txBody>
-          <a:bodyPr rtlCol="0" anchor="ctr"/>
-          <a:lstStyle/>
-          <a:p>
-            <a:pPr algn="ctr"/>
-            <a:endParaRPr lang="en-US"/>
+            <a:r>
+              <a:rPr lang="en-US" dirty="0"/>
+              <a:t>New Photo</a:t>
+            </a:r>
           </a:p>
         </p:txBody>
       </p:sp>
@@ -4035,6 +4191,11 @@
           <a:prstGeom prst="rect">
             <a:avLst/>
           </a:prstGeom>
+          <a:solidFill>
+            <a:schemeClr val="bg2">
+              <a:lumMod val="90000"/>
+            </a:schemeClr>
+          </a:solidFill>
         </p:spPr>
         <p:style>
           <a:lnRef idx="2">
@@ -4112,11 +4273,16 @@
         <p:spPr>
           <a:xfrm>
             <a:off x="4252427" y="601824"/>
-            <a:ext cx="3237724" cy="5654351"/>
+            <a:ext cx="3237724" cy="4072111"/>
           </a:xfrm>
           <a:prstGeom prst="rect">
             <a:avLst/>
           </a:prstGeom>
+          <a:solidFill>
+            <a:schemeClr val="bg2">
+              <a:lumMod val="90000"/>
+            </a:schemeClr>
+          </a:solidFill>
         </p:spPr>
         <p:style>
           <a:lnRef idx="2">
@@ -4139,7 +4305,7 @@
           <a:lstStyle/>
           <a:p>
             <a:pPr algn="ctr"/>
-            <a:endParaRPr lang="en-US"/>
+            <a:endParaRPr lang="en-US" dirty="0"/>
           </a:p>
         </p:txBody>
       </p:sp>
@@ -4199,6 +4365,11 @@
           <a:prstGeom prst="rect">
             <a:avLst/>
           </a:prstGeom>
+          <a:solidFill>
+            <a:schemeClr val="bg2">
+              <a:lumMod val="90000"/>
+            </a:schemeClr>
+          </a:solidFill>
         </p:spPr>
         <p:style>
           <a:lnRef idx="2">
@@ -4330,15 +4501,15 @@
           <p:nvPr/>
         </p:nvPicPr>
         <p:blipFill>
-          <a:blip r:embed="rId2"/>
+          <a:blip r:embed="rId3"/>
           <a:stretch>
             <a:fillRect/>
           </a:stretch>
         </p:blipFill>
         <p:spPr>
           <a:xfrm>
-            <a:off x="8262259" y="2364682"/>
-            <a:ext cx="3237724" cy="2068044"/>
+            <a:off x="8277421" y="2364682"/>
+            <a:ext cx="3222562" cy="2068044"/>
           </a:xfrm>
           <a:prstGeom prst="rect">
             <a:avLst/>
@@ -4449,8 +4620,8 @@
         </p:nvSpPr>
         <p:spPr>
           <a:xfrm>
-            <a:off x="8262259" y="5886843"/>
-            <a:ext cx="3237724" cy="369332"/>
+            <a:off x="8277421" y="5886843"/>
+            <a:ext cx="3222562" cy="350670"/>
           </a:xfrm>
           <a:prstGeom prst="rect">
             <a:avLst/>
@@ -4486,6 +4657,662 @@
           </a:p>
         </p:txBody>
       </p:sp>
+      <p:sp>
+        <p:nvSpPr>
+          <p:cNvPr id="15" name="Rectangle 14">
+            <a:extLst>
+              <a:ext uri="{FF2B5EF4-FFF2-40B4-BE49-F238E27FC236}">
+                <a16:creationId xmlns:a16="http://schemas.microsoft.com/office/drawing/2014/main" id="{DD87DCF2-8739-C0BB-5BEB-80C027D0E55E}"/>
+              </a:ext>
+            </a:extLst>
+          </p:cNvPr>
+          <p:cNvSpPr/>
+          <p:nvPr/>
+        </p:nvSpPr>
+        <p:spPr>
+          <a:xfrm>
+            <a:off x="4252426" y="1208317"/>
+            <a:ext cx="3237724" cy="369332"/>
+          </a:xfrm>
+          <a:prstGeom prst="rect">
+            <a:avLst/>
+          </a:prstGeom>
+          <a:effectLst>
+            <a:innerShdw blurRad="63500" dist="50800" dir="16200000">
+              <a:prstClr val="black">
+                <a:alpha val="50000"/>
+              </a:prstClr>
+            </a:innerShdw>
+          </a:effectLst>
+        </p:spPr>
+        <p:style>
+          <a:lnRef idx="2">
+            <a:schemeClr val="accent6"/>
+          </a:lnRef>
+          <a:fillRef idx="1">
+            <a:schemeClr val="lt1"/>
+          </a:fillRef>
+          <a:effectRef idx="0">
+            <a:schemeClr val="accent6"/>
+          </a:effectRef>
+          <a:fontRef idx="minor">
+            <a:schemeClr val="dk1"/>
+          </a:fontRef>
+        </p:style>
+        <p:txBody>
+          <a:bodyPr rtlCol="0" anchor="ctr"/>
+          <a:lstStyle/>
+          <a:p>
+            <a:pPr algn="ctr"/>
+            <a:r>
+              <a:rPr lang="en-US" dirty="0"/>
+              <a:t>Plant Name</a:t>
+            </a:r>
+          </a:p>
+        </p:txBody>
+      </p:sp>
+      <p:sp>
+        <p:nvSpPr>
+          <p:cNvPr id="18" name="Rectangle 17">
+            <a:extLst>
+              <a:ext uri="{FF2B5EF4-FFF2-40B4-BE49-F238E27FC236}">
+                <a16:creationId xmlns:a16="http://schemas.microsoft.com/office/drawing/2014/main" id="{79063655-AE66-016B-0C4C-22D3305BF9AC}"/>
+              </a:ext>
+            </a:extLst>
+          </p:cNvPr>
+          <p:cNvSpPr/>
+          <p:nvPr/>
+        </p:nvSpPr>
+        <p:spPr>
+          <a:xfrm>
+            <a:off x="4252426" y="1995350"/>
+            <a:ext cx="3237724" cy="369332"/>
+          </a:xfrm>
+          <a:prstGeom prst="rect">
+            <a:avLst/>
+          </a:prstGeom>
+          <a:effectLst>
+            <a:innerShdw blurRad="63500" dist="50800" dir="16200000">
+              <a:prstClr val="black">
+                <a:alpha val="50000"/>
+              </a:prstClr>
+            </a:innerShdw>
+          </a:effectLst>
+        </p:spPr>
+        <p:style>
+          <a:lnRef idx="2">
+            <a:schemeClr val="accent6"/>
+          </a:lnRef>
+          <a:fillRef idx="1">
+            <a:schemeClr val="lt1"/>
+          </a:fillRef>
+          <a:effectRef idx="0">
+            <a:schemeClr val="accent6"/>
+          </a:effectRef>
+          <a:fontRef idx="minor">
+            <a:schemeClr val="dk1"/>
+          </a:fontRef>
+        </p:style>
+        <p:txBody>
+          <a:bodyPr rtlCol="0" anchor="ctr"/>
+          <a:lstStyle/>
+          <a:p>
+            <a:pPr algn="ctr"/>
+            <a:r>
+              <a:rPr lang="en-US" dirty="0"/>
+              <a:t>Date Planted</a:t>
+            </a:r>
+          </a:p>
+        </p:txBody>
+      </p:sp>
+      <p:sp>
+        <p:nvSpPr>
+          <p:cNvPr id="3" name="TextBox 2">
+            <a:extLst>
+              <a:ext uri="{FF2B5EF4-FFF2-40B4-BE49-F238E27FC236}">
+                <a16:creationId xmlns:a16="http://schemas.microsoft.com/office/drawing/2014/main" id="{ABAD41E0-EC3B-AA43-B9AD-F9A371DF031B}"/>
+              </a:ext>
+            </a:extLst>
+          </p:cNvPr>
+          <p:cNvSpPr txBox="1"/>
+          <p:nvPr/>
+        </p:nvSpPr>
+        <p:spPr>
+          <a:xfrm>
+            <a:off x="4252424" y="1577649"/>
+            <a:ext cx="3237724" cy="369332"/>
+          </a:xfrm>
+          <a:prstGeom prst="rect">
+            <a:avLst/>
+          </a:prstGeom>
+          <a:noFill/>
+        </p:spPr>
+        <p:txBody>
+          <a:bodyPr wrap="square" rtlCol="0">
+            <a:spAutoFit/>
+          </a:bodyPr>
+          <a:lstStyle/>
+          <a:p>
+            <a:pPr algn="ctr"/>
+            <a:r>
+              <a:rPr lang="en-US" dirty="0"/>
+              <a:t>Test Plant Name</a:t>
+            </a:r>
+          </a:p>
+        </p:txBody>
+      </p:sp>
+      <p:sp>
+        <p:nvSpPr>
+          <p:cNvPr id="19" name="TextBox 18">
+            <a:extLst>
+              <a:ext uri="{FF2B5EF4-FFF2-40B4-BE49-F238E27FC236}">
+                <a16:creationId xmlns:a16="http://schemas.microsoft.com/office/drawing/2014/main" id="{B0D2F334-C368-68A5-60CC-418CA88B53DF}"/>
+              </a:ext>
+            </a:extLst>
+          </p:cNvPr>
+          <p:cNvSpPr txBox="1"/>
+          <p:nvPr/>
+        </p:nvSpPr>
+        <p:spPr>
+          <a:xfrm>
+            <a:off x="4252424" y="2413051"/>
+            <a:ext cx="3237724" cy="369332"/>
+          </a:xfrm>
+          <a:prstGeom prst="rect">
+            <a:avLst/>
+          </a:prstGeom>
+          <a:noFill/>
+        </p:spPr>
+        <p:txBody>
+          <a:bodyPr wrap="square" rtlCol="0">
+            <a:spAutoFit/>
+          </a:bodyPr>
+          <a:lstStyle/>
+          <a:p>
+            <a:pPr algn="ctr"/>
+            <a:r>
+              <a:rPr lang="en-US" dirty="0"/>
+              <a:t>Month, Day, Year</a:t>
+            </a:r>
+          </a:p>
+        </p:txBody>
+      </p:sp>
+      <p:sp>
+        <p:nvSpPr>
+          <p:cNvPr id="20" name="Rectangle 19">
+            <a:extLst>
+              <a:ext uri="{FF2B5EF4-FFF2-40B4-BE49-F238E27FC236}">
+                <a16:creationId xmlns:a16="http://schemas.microsoft.com/office/drawing/2014/main" id="{A2FF458E-9CF4-21A3-9FB4-0D707BD3B96B}"/>
+              </a:ext>
+            </a:extLst>
+          </p:cNvPr>
+          <p:cNvSpPr/>
+          <p:nvPr/>
+        </p:nvSpPr>
+        <p:spPr>
+          <a:xfrm>
+            <a:off x="4252424" y="2760547"/>
+            <a:ext cx="3237724" cy="369332"/>
+          </a:xfrm>
+          <a:prstGeom prst="rect">
+            <a:avLst/>
+          </a:prstGeom>
+          <a:effectLst>
+            <a:innerShdw blurRad="63500" dist="50800" dir="16200000">
+              <a:prstClr val="black">
+                <a:alpha val="50000"/>
+              </a:prstClr>
+            </a:innerShdw>
+          </a:effectLst>
+        </p:spPr>
+        <p:style>
+          <a:lnRef idx="2">
+            <a:schemeClr val="accent6"/>
+          </a:lnRef>
+          <a:fillRef idx="1">
+            <a:schemeClr val="lt1"/>
+          </a:fillRef>
+          <a:effectRef idx="0">
+            <a:schemeClr val="accent6"/>
+          </a:effectRef>
+          <a:fontRef idx="minor">
+            <a:schemeClr val="dk1"/>
+          </a:fontRef>
+        </p:style>
+        <p:txBody>
+          <a:bodyPr rtlCol="0" anchor="ctr"/>
+          <a:lstStyle/>
+          <a:p>
+            <a:pPr algn="ctr"/>
+            <a:r>
+              <a:rPr lang="en-US" dirty="0"/>
+              <a:t>Days Since Planting</a:t>
+            </a:r>
+          </a:p>
+        </p:txBody>
+      </p:sp>
+      <p:sp>
+        <p:nvSpPr>
+          <p:cNvPr id="22" name="TextBox 21">
+            <a:extLst>
+              <a:ext uri="{FF2B5EF4-FFF2-40B4-BE49-F238E27FC236}">
+                <a16:creationId xmlns:a16="http://schemas.microsoft.com/office/drawing/2014/main" id="{015D96C6-F05D-17D8-8782-0C0503C26EDE}"/>
+              </a:ext>
+            </a:extLst>
+          </p:cNvPr>
+          <p:cNvSpPr txBox="1"/>
+          <p:nvPr/>
+        </p:nvSpPr>
+        <p:spPr>
+          <a:xfrm>
+            <a:off x="4267587" y="3154063"/>
+            <a:ext cx="3237724" cy="369332"/>
+          </a:xfrm>
+          <a:prstGeom prst="rect">
+            <a:avLst/>
+          </a:prstGeom>
+          <a:noFill/>
+        </p:spPr>
+        <p:txBody>
+          <a:bodyPr wrap="square" rtlCol="0">
+            <a:spAutoFit/>
+          </a:bodyPr>
+          <a:lstStyle/>
+          <a:p>
+            <a:pPr algn="ctr"/>
+            <a:r>
+              <a:rPr lang="en-US" dirty="0"/>
+              <a:t>99999</a:t>
+            </a:r>
+          </a:p>
+        </p:txBody>
+      </p:sp>
+      <p:sp>
+        <p:nvSpPr>
+          <p:cNvPr id="23" name="Rectangle 22" descr="&#10;">
+            <a:extLst>
+              <a:ext uri="{FF2B5EF4-FFF2-40B4-BE49-F238E27FC236}">
+                <a16:creationId xmlns:a16="http://schemas.microsoft.com/office/drawing/2014/main" id="{2455C459-1806-530B-CF53-87B454032216}"/>
+              </a:ext>
+            </a:extLst>
+          </p:cNvPr>
+          <p:cNvSpPr/>
+          <p:nvPr/>
+        </p:nvSpPr>
+        <p:spPr>
+          <a:xfrm>
+            <a:off x="162120" y="1024968"/>
+            <a:ext cx="3237724" cy="369332"/>
+          </a:xfrm>
+          <a:prstGeom prst="rect">
+            <a:avLst/>
+          </a:prstGeom>
+          <a:effectLst>
+            <a:innerShdw blurRad="63500" dist="50800" dir="16200000">
+              <a:prstClr val="black">
+                <a:alpha val="50000"/>
+              </a:prstClr>
+            </a:innerShdw>
+          </a:effectLst>
+        </p:spPr>
+        <p:style>
+          <a:lnRef idx="2">
+            <a:schemeClr val="accent6"/>
+          </a:lnRef>
+          <a:fillRef idx="1">
+            <a:schemeClr val="lt1"/>
+          </a:fillRef>
+          <a:effectRef idx="0">
+            <a:schemeClr val="accent6"/>
+          </a:effectRef>
+          <a:fontRef idx="minor">
+            <a:schemeClr val="dk1"/>
+          </a:fontRef>
+        </p:style>
+        <p:txBody>
+          <a:bodyPr rtlCol="0" anchor="ctr"/>
+          <a:lstStyle/>
+          <a:p>
+            <a:pPr algn="ctr"/>
+            <a:r>
+              <a:rPr lang="en-US" dirty="0"/>
+              <a:t>Moisture Level</a:t>
+            </a:r>
+          </a:p>
+        </p:txBody>
+      </p:sp>
+      <p:pic>
+        <p:nvPicPr>
+          <p:cNvPr id="24" name="Picture 23">
+            <a:extLst>
+              <a:ext uri="{FF2B5EF4-FFF2-40B4-BE49-F238E27FC236}">
+                <a16:creationId xmlns:a16="http://schemas.microsoft.com/office/drawing/2014/main" id="{1FF0FD65-9F8F-40E6-FD4C-301EFC1E4474}"/>
+              </a:ext>
+            </a:extLst>
+          </p:cNvPr>
+          <p:cNvPicPr>
+            <a:picLocks noChangeAspect="1"/>
+          </p:cNvPicPr>
+          <p:nvPr/>
+        </p:nvPicPr>
+        <p:blipFill>
+          <a:blip r:embed="rId3"/>
+          <a:stretch>
+            <a:fillRect/>
+          </a:stretch>
+        </p:blipFill>
+        <p:spPr>
+          <a:xfrm>
+            <a:off x="169700" y="1392983"/>
+            <a:ext cx="3230144" cy="2068044"/>
+          </a:xfrm>
+          <a:prstGeom prst="rect">
+            <a:avLst/>
+          </a:prstGeom>
+        </p:spPr>
+      </p:pic>
+      <p:sp>
+        <p:nvSpPr>
+          <p:cNvPr id="25" name="TextBox 24">
+            <a:extLst>
+              <a:ext uri="{FF2B5EF4-FFF2-40B4-BE49-F238E27FC236}">
+                <a16:creationId xmlns:a16="http://schemas.microsoft.com/office/drawing/2014/main" id="{1806588D-B7C2-CDC7-EAC1-BFC76892CC3B}"/>
+              </a:ext>
+            </a:extLst>
+          </p:cNvPr>
+          <p:cNvSpPr txBox="1"/>
+          <p:nvPr/>
+        </p:nvSpPr>
+        <p:spPr>
+          <a:xfrm>
+            <a:off x="146961" y="3461027"/>
+            <a:ext cx="3237724" cy="369332"/>
+          </a:xfrm>
+          <a:prstGeom prst="rect">
+            <a:avLst/>
+          </a:prstGeom>
+          <a:noFill/>
+        </p:spPr>
+        <p:txBody>
+          <a:bodyPr wrap="square" rtlCol="0">
+            <a:spAutoFit/>
+          </a:bodyPr>
+          <a:lstStyle/>
+          <a:p>
+            <a:pPr algn="ctr"/>
+            <a:r>
+              <a:rPr lang="en-US" dirty="0"/>
+              <a:t>Last Watered: XXXX days ago</a:t>
+            </a:r>
+          </a:p>
+        </p:txBody>
+      </p:sp>
+      <p:sp>
+        <p:nvSpPr>
+          <p:cNvPr id="4" name="Rectangle 3">
+            <a:extLst>
+              <a:ext uri="{FF2B5EF4-FFF2-40B4-BE49-F238E27FC236}">
+                <a16:creationId xmlns:a16="http://schemas.microsoft.com/office/drawing/2014/main" id="{CB83008A-8394-CC68-B5D0-C52D71609000}"/>
+              </a:ext>
+            </a:extLst>
+          </p:cNvPr>
+          <p:cNvSpPr/>
+          <p:nvPr/>
+        </p:nvSpPr>
+        <p:spPr>
+          <a:xfrm>
+            <a:off x="895122" y="3985591"/>
+            <a:ext cx="1741401" cy="526774"/>
+          </a:xfrm>
+          <a:prstGeom prst="rect">
+            <a:avLst/>
+          </a:prstGeom>
+          <a:solidFill>
+            <a:schemeClr val="accent1"/>
+          </a:solidFill>
+          <a:scene3d>
+            <a:camera prst="orthographicFront"/>
+            <a:lightRig rig="threePt" dir="t"/>
+          </a:scene3d>
+          <a:sp3d>
+            <a:bevelT w="165100" prst="coolSlant"/>
+          </a:sp3d>
+        </p:spPr>
+        <p:style>
+          <a:lnRef idx="2">
+            <a:schemeClr val="accent1">
+              <a:shade val="50000"/>
+            </a:schemeClr>
+          </a:lnRef>
+          <a:fillRef idx="1">
+            <a:schemeClr val="accent1"/>
+          </a:fillRef>
+          <a:effectRef idx="0">
+            <a:schemeClr val="accent1"/>
+          </a:effectRef>
+          <a:fontRef idx="minor">
+            <a:schemeClr val="lt1"/>
+          </a:fontRef>
+        </p:style>
+        <p:txBody>
+          <a:bodyPr rtlCol="0" anchor="ctr"/>
+          <a:lstStyle/>
+          <a:p>
+            <a:pPr algn="ctr"/>
+            <a:r>
+              <a:rPr lang="en-US" dirty="0"/>
+              <a:t>Water</a:t>
+            </a:r>
+          </a:p>
+        </p:txBody>
+      </p:sp>
+      <p:sp>
+        <p:nvSpPr>
+          <p:cNvPr id="26" name="Rectangle 25">
+            <a:extLst>
+              <a:ext uri="{FF2B5EF4-FFF2-40B4-BE49-F238E27FC236}">
+                <a16:creationId xmlns:a16="http://schemas.microsoft.com/office/drawing/2014/main" id="{67240134-B986-1ADD-63D6-2064D3282F9A}"/>
+              </a:ext>
+            </a:extLst>
+          </p:cNvPr>
+          <p:cNvSpPr/>
+          <p:nvPr/>
+        </p:nvSpPr>
+        <p:spPr>
+          <a:xfrm>
+            <a:off x="169698" y="4673935"/>
+            <a:ext cx="3214987" cy="369332"/>
+          </a:xfrm>
+          <a:prstGeom prst="rect">
+            <a:avLst/>
+          </a:prstGeom>
+          <a:effectLst>
+            <a:innerShdw blurRad="63500" dist="50800" dir="16200000">
+              <a:prstClr val="black">
+                <a:alpha val="50000"/>
+              </a:prstClr>
+            </a:innerShdw>
+          </a:effectLst>
+        </p:spPr>
+        <p:style>
+          <a:lnRef idx="2">
+            <a:schemeClr val="accent6"/>
+          </a:lnRef>
+          <a:fillRef idx="1">
+            <a:schemeClr val="lt1"/>
+          </a:fillRef>
+          <a:effectRef idx="0">
+            <a:schemeClr val="accent6"/>
+          </a:effectRef>
+          <a:fontRef idx="minor">
+            <a:schemeClr val="dk1"/>
+          </a:fontRef>
+        </p:style>
+        <p:txBody>
+          <a:bodyPr rtlCol="0" anchor="ctr"/>
+          <a:lstStyle/>
+          <a:p>
+            <a:pPr algn="ctr"/>
+            <a:r>
+              <a:rPr lang="en-US" dirty="0"/>
+              <a:t>Light Level</a:t>
+            </a:r>
+          </a:p>
+        </p:txBody>
+      </p:sp>
+      <p:pic>
+        <p:nvPicPr>
+          <p:cNvPr id="27" name="Picture 26">
+            <a:extLst>
+              <a:ext uri="{FF2B5EF4-FFF2-40B4-BE49-F238E27FC236}">
+                <a16:creationId xmlns:a16="http://schemas.microsoft.com/office/drawing/2014/main" id="{8DCE07AF-7CF2-9E44-AD64-6781BDD9CCE3}"/>
+              </a:ext>
+            </a:extLst>
+          </p:cNvPr>
+          <p:cNvPicPr>
+            <a:picLocks noChangeAspect="1"/>
+          </p:cNvPicPr>
+          <p:nvPr/>
+        </p:nvPicPr>
+        <p:blipFill>
+          <a:blip r:embed="rId3"/>
+          <a:stretch>
+            <a:fillRect/>
+          </a:stretch>
+        </p:blipFill>
+        <p:spPr>
+          <a:xfrm>
+            <a:off x="169700" y="5043266"/>
+            <a:ext cx="3230144" cy="1212909"/>
+          </a:xfrm>
+          <a:prstGeom prst="rect">
+            <a:avLst/>
+          </a:prstGeom>
+        </p:spPr>
+      </p:pic>
+      <p:sp>
+        <p:nvSpPr>
+          <p:cNvPr id="28" name="Rectangle 27">
+            <a:hlinkClick r:id="rId4" action="ppaction://hlinksldjump"/>
+            <a:extLst>
+              <a:ext uri="{FF2B5EF4-FFF2-40B4-BE49-F238E27FC236}">
+                <a16:creationId xmlns:a16="http://schemas.microsoft.com/office/drawing/2014/main" id="{FD682DDE-4049-E728-B6B8-C5CCC4A761E1}"/>
+              </a:ext>
+            </a:extLst>
+          </p:cNvPr>
+          <p:cNvSpPr/>
+          <p:nvPr/>
+        </p:nvSpPr>
+        <p:spPr>
+          <a:xfrm>
+            <a:off x="5015748" y="5710739"/>
+            <a:ext cx="1741401" cy="526774"/>
+          </a:xfrm>
+          <a:prstGeom prst="rect">
+            <a:avLst/>
+          </a:prstGeom>
+          <a:solidFill>
+            <a:schemeClr val="accent1"/>
+          </a:solidFill>
+          <a:scene3d>
+            <a:camera prst="orthographicFront"/>
+            <a:lightRig rig="threePt" dir="t"/>
+          </a:scene3d>
+          <a:sp3d>
+            <a:bevelT w="165100" prst="coolSlant"/>
+          </a:sp3d>
+        </p:spPr>
+        <p:style>
+          <a:lnRef idx="2">
+            <a:schemeClr val="accent1">
+              <a:shade val="50000"/>
+            </a:schemeClr>
+          </a:lnRef>
+          <a:fillRef idx="1">
+            <a:schemeClr val="accent1"/>
+          </a:fillRef>
+          <a:effectRef idx="0">
+            <a:schemeClr val="accent1"/>
+          </a:effectRef>
+          <a:fontRef idx="minor">
+            <a:schemeClr val="lt1"/>
+          </a:fontRef>
+        </p:style>
+        <p:txBody>
+          <a:bodyPr rtlCol="0" anchor="ctr"/>
+          <a:lstStyle/>
+          <a:p>
+            <a:pPr algn="ctr"/>
+            <a:r>
+              <a:rPr lang="en-US" dirty="0"/>
+              <a:t>Back</a:t>
+            </a:r>
+          </a:p>
+        </p:txBody>
+      </p:sp>
+      <p:sp>
+        <p:nvSpPr>
+          <p:cNvPr id="29" name="Rectangle 28">
+            <a:extLst>
+              <a:ext uri="{FF2B5EF4-FFF2-40B4-BE49-F238E27FC236}">
+                <a16:creationId xmlns:a16="http://schemas.microsoft.com/office/drawing/2014/main" id="{99FEEE27-E8FD-6538-8697-C0621E85D781}"/>
+              </a:ext>
+            </a:extLst>
+          </p:cNvPr>
+          <p:cNvSpPr/>
+          <p:nvPr/>
+        </p:nvSpPr>
+        <p:spPr>
+          <a:xfrm>
+            <a:off x="8277421" y="5509440"/>
+            <a:ext cx="3207824" cy="369332"/>
+          </a:xfrm>
+          <a:prstGeom prst="rect">
+            <a:avLst/>
+          </a:prstGeom>
+          <a:solidFill>
+            <a:schemeClr val="accent1"/>
+          </a:solidFill>
+          <a:ln>
+            <a:solidFill>
+              <a:schemeClr val="accent1"/>
+            </a:solidFill>
+          </a:ln>
+          <a:effectLst/>
+          <a:scene3d>
+            <a:camera prst="orthographicFront"/>
+            <a:lightRig rig="threePt" dir="t"/>
+          </a:scene3d>
+          <a:sp3d>
+            <a:bevelT/>
+          </a:sp3d>
+        </p:spPr>
+        <p:style>
+          <a:lnRef idx="2">
+            <a:schemeClr val="accent6"/>
+          </a:lnRef>
+          <a:fillRef idx="1">
+            <a:schemeClr val="lt1"/>
+          </a:fillRef>
+          <a:effectRef idx="0">
+            <a:schemeClr val="accent6"/>
+          </a:effectRef>
+          <a:fontRef idx="minor">
+            <a:schemeClr val="dk1"/>
+          </a:fontRef>
+        </p:style>
+        <p:txBody>
+          <a:bodyPr rtlCol="0" anchor="ctr"/>
+          <a:lstStyle/>
+          <a:p>
+            <a:pPr algn="ctr"/>
+            <a:r>
+              <a:rPr lang="en-US" dirty="0"/>
+              <a:t>Calibrate Sensors</a:t>
+            </a:r>
+          </a:p>
+        </p:txBody>
+      </p:sp>
     </p:spTree>
     <p:extLst>
       <p:ext uri="{BB962C8B-B14F-4D97-AF65-F5344CB8AC3E}">
@@ -4496,6 +5323,2409 @@
   <p:clrMapOvr>
     <a:masterClrMapping/>
   </p:clrMapOvr>
+  <p:extLst>
+    <p:ext uri="{6950BFC3-D8DA-4A85-94F7-54DA5524770B}">
+      <p188:commentRel xmlns:p188="http://schemas.microsoft.com/office/powerpoint/2018/8/main" r:id="rId2"/>
+    </p:ext>
+  </p:extLst>
+</p:sld>
+</file>
+
+<file path=ppt/slides/slide3.xml><?xml version="1.0" encoding="utf-8"?>
+<p:sld xmlns:a="http://schemas.openxmlformats.org/drawingml/2006/main" xmlns:r="http://schemas.openxmlformats.org/officeDocument/2006/relationships" xmlns:p="http://schemas.openxmlformats.org/presentationml/2006/main">
+  <p:cSld>
+    <p:spTree>
+      <p:nvGrpSpPr>
+        <p:cNvPr id="1" name=""/>
+        <p:cNvGrpSpPr/>
+        <p:nvPr/>
+      </p:nvGrpSpPr>
+      <p:grpSpPr>
+        <a:xfrm>
+          <a:off x="0" y="0"/>
+          <a:ext cx="0" cy="0"/>
+          <a:chOff x="0" y="0"/>
+          <a:chExt cx="0" cy="0"/>
+        </a:xfrm>
+      </p:grpSpPr>
+      <p:sp>
+        <p:nvSpPr>
+          <p:cNvPr id="4" name="TextBox 3">
+            <a:extLst>
+              <a:ext uri="{FF2B5EF4-FFF2-40B4-BE49-F238E27FC236}">
+                <a16:creationId xmlns:a16="http://schemas.microsoft.com/office/drawing/2014/main" id="{959F4C1C-DFAB-4285-BFD0-0F4547AB49F1}"/>
+              </a:ext>
+            </a:extLst>
+          </p:cNvPr>
+          <p:cNvSpPr txBox="1"/>
+          <p:nvPr/>
+        </p:nvSpPr>
+        <p:spPr>
+          <a:xfrm>
+            <a:off x="2335763" y="688519"/>
+            <a:ext cx="7520473" cy="369332"/>
+          </a:xfrm>
+          <a:prstGeom prst="rect">
+            <a:avLst/>
+          </a:prstGeom>
+          <a:noFill/>
+        </p:spPr>
+        <p:txBody>
+          <a:bodyPr wrap="square" rtlCol="0">
+            <a:spAutoFit/>
+          </a:bodyPr>
+          <a:lstStyle/>
+          <a:p>
+            <a:pPr algn="ctr"/>
+            <a:r>
+              <a:rPr lang="en-US" dirty="0"/>
+              <a:t>Plant Waterer Server</a:t>
+            </a:r>
+          </a:p>
+        </p:txBody>
+      </p:sp>
+      <p:sp>
+        <p:nvSpPr>
+          <p:cNvPr id="5" name="Rectangle 4">
+            <a:extLst>
+              <a:ext uri="{FF2B5EF4-FFF2-40B4-BE49-F238E27FC236}">
+                <a16:creationId xmlns:a16="http://schemas.microsoft.com/office/drawing/2014/main" id="{890FDA78-8084-4087-A11B-BA970835D71D}"/>
+              </a:ext>
+            </a:extLst>
+          </p:cNvPr>
+          <p:cNvSpPr/>
+          <p:nvPr/>
+        </p:nvSpPr>
+        <p:spPr>
+          <a:xfrm>
+            <a:off x="1024812" y="1548883"/>
+            <a:ext cx="2621902" cy="4058816"/>
+          </a:xfrm>
+          <a:prstGeom prst="rect">
+            <a:avLst/>
+          </a:prstGeom>
+          <a:solidFill>
+            <a:schemeClr val="bg2"/>
+          </a:solidFill>
+        </p:spPr>
+        <p:style>
+          <a:lnRef idx="2">
+            <a:schemeClr val="accent1">
+              <a:shade val="50000"/>
+            </a:schemeClr>
+          </a:lnRef>
+          <a:fillRef idx="1">
+            <a:schemeClr val="accent1"/>
+          </a:fillRef>
+          <a:effectRef idx="0">
+            <a:schemeClr val="accent1"/>
+          </a:effectRef>
+          <a:fontRef idx="minor">
+            <a:schemeClr val="lt1"/>
+          </a:fontRef>
+        </p:style>
+        <p:txBody>
+          <a:bodyPr rtlCol="0" anchor="ctr"/>
+          <a:lstStyle/>
+          <a:p>
+            <a:pPr algn="ctr"/>
+            <a:endParaRPr lang="en-US"/>
+          </a:p>
+        </p:txBody>
+      </p:sp>
+      <p:sp>
+        <p:nvSpPr>
+          <p:cNvPr id="6" name="Rectangle 5">
+            <a:extLst>
+              <a:ext uri="{FF2B5EF4-FFF2-40B4-BE49-F238E27FC236}">
+                <a16:creationId xmlns:a16="http://schemas.microsoft.com/office/drawing/2014/main" id="{B7C2B2CB-ED07-490A-888E-3C43FA10E502}"/>
+              </a:ext>
+            </a:extLst>
+          </p:cNvPr>
+          <p:cNvSpPr/>
+          <p:nvPr/>
+        </p:nvSpPr>
+        <p:spPr>
+          <a:xfrm>
+            <a:off x="4785048" y="1548883"/>
+            <a:ext cx="2621902" cy="4058816"/>
+          </a:xfrm>
+          <a:prstGeom prst="rect">
+            <a:avLst/>
+          </a:prstGeom>
+          <a:solidFill>
+            <a:schemeClr val="bg2"/>
+          </a:solidFill>
+        </p:spPr>
+        <p:style>
+          <a:lnRef idx="2">
+            <a:schemeClr val="accent1">
+              <a:shade val="50000"/>
+            </a:schemeClr>
+          </a:lnRef>
+          <a:fillRef idx="1">
+            <a:schemeClr val="accent1"/>
+          </a:fillRef>
+          <a:effectRef idx="0">
+            <a:schemeClr val="accent1"/>
+          </a:effectRef>
+          <a:fontRef idx="minor">
+            <a:schemeClr val="lt1"/>
+          </a:fontRef>
+        </p:style>
+        <p:txBody>
+          <a:bodyPr rtlCol="0" anchor="ctr"/>
+          <a:lstStyle/>
+          <a:p>
+            <a:pPr algn="ctr"/>
+            <a:endParaRPr lang="en-US"/>
+          </a:p>
+        </p:txBody>
+      </p:sp>
+      <p:sp>
+        <p:nvSpPr>
+          <p:cNvPr id="14" name="Rectangle 13">
+            <a:hlinkClick r:id="rId2" action="ppaction://hlinksldjump"/>
+            <a:extLst>
+              <a:ext uri="{FF2B5EF4-FFF2-40B4-BE49-F238E27FC236}">
+                <a16:creationId xmlns:a16="http://schemas.microsoft.com/office/drawing/2014/main" id="{424C8689-1EEA-4A29-903B-E2BE807380C2}"/>
+              </a:ext>
+            </a:extLst>
+          </p:cNvPr>
+          <p:cNvSpPr/>
+          <p:nvPr/>
+        </p:nvSpPr>
+        <p:spPr>
+          <a:xfrm>
+            <a:off x="1024812" y="4069323"/>
+            <a:ext cx="2621900" cy="517848"/>
+          </a:xfrm>
+          <a:prstGeom prst="rect">
+            <a:avLst/>
+          </a:prstGeom>
+          <a:solidFill>
+            <a:schemeClr val="accent3"/>
+          </a:solidFill>
+        </p:spPr>
+        <p:style>
+          <a:lnRef idx="2">
+            <a:schemeClr val="accent1">
+              <a:shade val="50000"/>
+            </a:schemeClr>
+          </a:lnRef>
+          <a:fillRef idx="1">
+            <a:schemeClr val="accent1"/>
+          </a:fillRef>
+          <a:effectRef idx="0">
+            <a:schemeClr val="accent1"/>
+          </a:effectRef>
+          <a:fontRef idx="minor">
+            <a:schemeClr val="lt1"/>
+          </a:fontRef>
+        </p:style>
+        <p:txBody>
+          <a:bodyPr rtlCol="0" anchor="ctr"/>
+          <a:lstStyle/>
+          <a:p>
+            <a:pPr algn="ctr"/>
+            <a:r>
+              <a:rPr lang="en-US" dirty="0"/>
+              <a:t>Sunlight level</a:t>
+            </a:r>
+          </a:p>
+        </p:txBody>
+      </p:sp>
+      <p:sp>
+        <p:nvSpPr>
+          <p:cNvPr id="15" name="Rectangle 14">
+            <a:hlinkClick r:id="rId3" action="ppaction://hlinksldjump"/>
+            <a:extLst>
+              <a:ext uri="{FF2B5EF4-FFF2-40B4-BE49-F238E27FC236}">
+                <a16:creationId xmlns:a16="http://schemas.microsoft.com/office/drawing/2014/main" id="{80DBFCFD-4C5B-4C97-8AF2-EB77D54DF65C}"/>
+              </a:ext>
+            </a:extLst>
+          </p:cNvPr>
+          <p:cNvSpPr/>
+          <p:nvPr/>
+        </p:nvSpPr>
+        <p:spPr>
+          <a:xfrm>
+            <a:off x="1024812" y="4587171"/>
+            <a:ext cx="2621900" cy="517848"/>
+          </a:xfrm>
+          <a:prstGeom prst="rect">
+            <a:avLst/>
+          </a:prstGeom>
+          <a:solidFill>
+            <a:schemeClr val="accent3"/>
+          </a:solidFill>
+        </p:spPr>
+        <p:style>
+          <a:lnRef idx="2">
+            <a:schemeClr val="accent1">
+              <a:shade val="50000"/>
+            </a:schemeClr>
+          </a:lnRef>
+          <a:fillRef idx="1">
+            <a:schemeClr val="accent1"/>
+          </a:fillRef>
+          <a:effectRef idx="0">
+            <a:schemeClr val="accent1"/>
+          </a:effectRef>
+          <a:fontRef idx="minor">
+            <a:schemeClr val="lt1"/>
+          </a:fontRef>
+        </p:style>
+        <p:txBody>
+          <a:bodyPr rtlCol="0" anchor="ctr"/>
+          <a:lstStyle/>
+          <a:p>
+            <a:pPr algn="ctr"/>
+            <a:r>
+              <a:rPr lang="en-US" dirty="0"/>
+              <a:t>Signal Strength</a:t>
+            </a:r>
+          </a:p>
+        </p:txBody>
+      </p:sp>
+      <p:sp>
+        <p:nvSpPr>
+          <p:cNvPr id="16" name="Rectangle 15">
+            <a:hlinkClick r:id="rId4" action="ppaction://hlinksldjump"/>
+            <a:extLst>
+              <a:ext uri="{FF2B5EF4-FFF2-40B4-BE49-F238E27FC236}">
+                <a16:creationId xmlns:a16="http://schemas.microsoft.com/office/drawing/2014/main" id="{E005A488-05A3-490E-979F-821E35D48E1D}"/>
+              </a:ext>
+            </a:extLst>
+          </p:cNvPr>
+          <p:cNvSpPr/>
+          <p:nvPr/>
+        </p:nvSpPr>
+        <p:spPr>
+          <a:xfrm>
+            <a:off x="1024812" y="5105019"/>
+            <a:ext cx="2621900" cy="517848"/>
+          </a:xfrm>
+          <a:prstGeom prst="rect">
+            <a:avLst/>
+          </a:prstGeom>
+          <a:solidFill>
+            <a:schemeClr val="accent3"/>
+          </a:solidFill>
+        </p:spPr>
+        <p:style>
+          <a:lnRef idx="2">
+            <a:schemeClr val="accent1">
+              <a:shade val="50000"/>
+            </a:schemeClr>
+          </a:lnRef>
+          <a:fillRef idx="1">
+            <a:schemeClr val="accent1"/>
+          </a:fillRef>
+          <a:effectRef idx="0">
+            <a:schemeClr val="accent1"/>
+          </a:effectRef>
+          <a:fontRef idx="minor">
+            <a:schemeClr val="lt1"/>
+          </a:fontRef>
+        </p:style>
+        <p:txBody>
+          <a:bodyPr rtlCol="0" anchor="ctr"/>
+          <a:lstStyle/>
+          <a:p>
+            <a:pPr algn="ctr"/>
+            <a:r>
+              <a:rPr lang="en-US" dirty="0"/>
+              <a:t>More Info</a:t>
+            </a:r>
+          </a:p>
+        </p:txBody>
+      </p:sp>
+      <p:sp>
+        <p:nvSpPr>
+          <p:cNvPr id="17" name="TextBox 16">
+            <a:extLst>
+              <a:ext uri="{FF2B5EF4-FFF2-40B4-BE49-F238E27FC236}">
+                <a16:creationId xmlns:a16="http://schemas.microsoft.com/office/drawing/2014/main" id="{BFDEA7D4-8E3A-46D8-A625-1FD30FCCE1E7}"/>
+              </a:ext>
+            </a:extLst>
+          </p:cNvPr>
+          <p:cNvSpPr txBox="1"/>
+          <p:nvPr/>
+        </p:nvSpPr>
+        <p:spPr>
+          <a:xfrm>
+            <a:off x="139959" y="167951"/>
+            <a:ext cx="2621900" cy="369332"/>
+          </a:xfrm>
+          <a:prstGeom prst="rect">
+            <a:avLst/>
+          </a:prstGeom>
+          <a:noFill/>
+        </p:spPr>
+        <p:txBody>
+          <a:bodyPr wrap="square" rtlCol="0">
+            <a:spAutoFit/>
+          </a:bodyPr>
+          <a:lstStyle/>
+          <a:p>
+            <a:r>
+              <a:rPr lang="en-US" dirty="0"/>
+              <a:t>Home Page</a:t>
+            </a:r>
+          </a:p>
+        </p:txBody>
+      </p:sp>
+      <p:sp>
+        <p:nvSpPr>
+          <p:cNvPr id="2" name="Oval 1">
+            <a:hlinkClick r:id="rId5" action="ppaction://hlinksldjump"/>
+            <a:extLst>
+              <a:ext uri="{FF2B5EF4-FFF2-40B4-BE49-F238E27FC236}">
+                <a16:creationId xmlns:a16="http://schemas.microsoft.com/office/drawing/2014/main" id="{44BC48E6-161B-2907-60CF-95D1A9DB64C4}"/>
+              </a:ext>
+            </a:extLst>
+          </p:cNvPr>
+          <p:cNvSpPr/>
+          <p:nvPr/>
+        </p:nvSpPr>
+        <p:spPr>
+          <a:xfrm>
+            <a:off x="5695949" y="3034719"/>
+            <a:ext cx="800100" cy="787981"/>
+          </a:xfrm>
+          <a:prstGeom prst="ellipse">
+            <a:avLst/>
+          </a:prstGeom>
+          <a:solidFill>
+            <a:schemeClr val="bg1"/>
+          </a:solidFill>
+          <a:ln>
+            <a:solidFill>
+              <a:schemeClr val="bg1">
+                <a:lumMod val="85000"/>
+              </a:schemeClr>
+            </a:solidFill>
+          </a:ln>
+        </p:spPr>
+        <p:style>
+          <a:lnRef idx="2">
+            <a:schemeClr val="accent1">
+              <a:shade val="50000"/>
+            </a:schemeClr>
+          </a:lnRef>
+          <a:fillRef idx="1">
+            <a:schemeClr val="accent1"/>
+          </a:fillRef>
+          <a:effectRef idx="0">
+            <a:schemeClr val="accent1"/>
+          </a:effectRef>
+          <a:fontRef idx="minor">
+            <a:schemeClr val="lt1"/>
+          </a:fontRef>
+        </p:style>
+        <p:txBody>
+          <a:bodyPr rtlCol="0" anchor="ctr"/>
+          <a:lstStyle/>
+          <a:p>
+            <a:pPr algn="ctr"/>
+            <a:endParaRPr lang="en-US"/>
+          </a:p>
+        </p:txBody>
+      </p:sp>
+      <p:sp>
+        <p:nvSpPr>
+          <p:cNvPr id="3" name="Plus Sign 2">
+            <a:extLst>
+              <a:ext uri="{FF2B5EF4-FFF2-40B4-BE49-F238E27FC236}">
+                <a16:creationId xmlns:a16="http://schemas.microsoft.com/office/drawing/2014/main" id="{537AE8F3-2DD5-9CF1-7E7D-FA535D7F730B}"/>
+              </a:ext>
+            </a:extLst>
+          </p:cNvPr>
+          <p:cNvSpPr/>
+          <p:nvPr/>
+        </p:nvSpPr>
+        <p:spPr>
+          <a:xfrm>
+            <a:off x="5924549" y="3247410"/>
+            <a:ext cx="342900" cy="362598"/>
+          </a:xfrm>
+          <a:prstGeom prst="mathPlus">
+            <a:avLst/>
+          </a:prstGeom>
+        </p:spPr>
+        <p:style>
+          <a:lnRef idx="2">
+            <a:schemeClr val="accent1">
+              <a:shade val="50000"/>
+            </a:schemeClr>
+          </a:lnRef>
+          <a:fillRef idx="1">
+            <a:schemeClr val="accent1"/>
+          </a:fillRef>
+          <a:effectRef idx="0">
+            <a:schemeClr val="accent1"/>
+          </a:effectRef>
+          <a:fontRef idx="minor">
+            <a:schemeClr val="lt1"/>
+          </a:fontRef>
+        </p:style>
+        <p:txBody>
+          <a:bodyPr rtlCol="0" anchor="ctr"/>
+          <a:lstStyle/>
+          <a:p>
+            <a:pPr algn="ctr"/>
+            <a:endParaRPr lang="en-US"/>
+          </a:p>
+        </p:txBody>
+      </p:sp>
+      <p:sp>
+        <p:nvSpPr>
+          <p:cNvPr id="19" name="Rectangle 18">
+            <a:hlinkClick r:id="rId6" action="ppaction://hlinksldjump"/>
+            <a:extLst>
+              <a:ext uri="{FF2B5EF4-FFF2-40B4-BE49-F238E27FC236}">
+                <a16:creationId xmlns:a16="http://schemas.microsoft.com/office/drawing/2014/main" id="{3BE5FDC9-DDF4-549B-53E7-ABA7BCD1C161}"/>
+              </a:ext>
+            </a:extLst>
+          </p:cNvPr>
+          <p:cNvSpPr/>
+          <p:nvPr/>
+        </p:nvSpPr>
+        <p:spPr>
+          <a:xfrm>
+            <a:off x="1024812" y="1557109"/>
+            <a:ext cx="2621900" cy="517848"/>
+          </a:xfrm>
+          <a:prstGeom prst="rect">
+            <a:avLst/>
+          </a:prstGeom>
+          <a:solidFill>
+            <a:schemeClr val="accent3"/>
+          </a:solidFill>
+        </p:spPr>
+        <p:style>
+          <a:lnRef idx="2">
+            <a:schemeClr val="accent1">
+              <a:shade val="50000"/>
+            </a:schemeClr>
+          </a:lnRef>
+          <a:fillRef idx="1">
+            <a:schemeClr val="accent1"/>
+          </a:fillRef>
+          <a:effectRef idx="0">
+            <a:schemeClr val="accent1"/>
+          </a:effectRef>
+          <a:fontRef idx="minor">
+            <a:schemeClr val="lt1"/>
+          </a:fontRef>
+        </p:style>
+        <p:txBody>
+          <a:bodyPr rtlCol="0" anchor="ctr"/>
+          <a:lstStyle/>
+          <a:p>
+            <a:pPr algn="ctr"/>
+            <a:r>
+              <a:rPr lang="en-US" dirty="0"/>
+              <a:t>Plant Name</a:t>
+            </a:r>
+          </a:p>
+        </p:txBody>
+      </p:sp>
+      <p:pic>
+        <p:nvPicPr>
+          <p:cNvPr id="20" name="Picture 19">
+            <a:extLst>
+              <a:ext uri="{FF2B5EF4-FFF2-40B4-BE49-F238E27FC236}">
+                <a16:creationId xmlns:a16="http://schemas.microsoft.com/office/drawing/2014/main" id="{FE0B02DF-031E-BFDD-A0D6-B56A9D2D4274}"/>
+              </a:ext>
+            </a:extLst>
+          </p:cNvPr>
+          <p:cNvPicPr>
+            <a:picLocks noChangeAspect="1"/>
+          </p:cNvPicPr>
+          <p:nvPr/>
+        </p:nvPicPr>
+        <p:blipFill>
+          <a:blip r:embed="rId7"/>
+          <a:stretch>
+            <a:fillRect/>
+          </a:stretch>
+        </p:blipFill>
+        <p:spPr>
+          <a:xfrm>
+            <a:off x="1045028" y="2581095"/>
+            <a:ext cx="2601683" cy="1473059"/>
+          </a:xfrm>
+          <a:prstGeom prst="rect">
+            <a:avLst/>
+          </a:prstGeom>
+        </p:spPr>
+      </p:pic>
+      <p:sp>
+        <p:nvSpPr>
+          <p:cNvPr id="21" name="TextBox 20">
+            <a:extLst>
+              <a:ext uri="{FF2B5EF4-FFF2-40B4-BE49-F238E27FC236}">
+                <a16:creationId xmlns:a16="http://schemas.microsoft.com/office/drawing/2014/main" id="{2F6F6419-B0BC-6E60-76DC-FE4B0CD1728B}"/>
+              </a:ext>
+            </a:extLst>
+          </p:cNvPr>
+          <p:cNvSpPr txBox="1"/>
+          <p:nvPr/>
+        </p:nvSpPr>
+        <p:spPr>
+          <a:xfrm>
+            <a:off x="1024810" y="2130911"/>
+            <a:ext cx="2621902" cy="369332"/>
+          </a:xfrm>
+          <a:prstGeom prst="rect">
+            <a:avLst/>
+          </a:prstGeom>
+          <a:noFill/>
+        </p:spPr>
+        <p:txBody>
+          <a:bodyPr wrap="square">
+            <a:spAutoFit/>
+          </a:bodyPr>
+          <a:lstStyle/>
+          <a:p>
+            <a:pPr algn="ctr"/>
+            <a:r>
+              <a:rPr lang="en-US" dirty="0"/>
+              <a:t>Soil Moisture Level</a:t>
+            </a:r>
+          </a:p>
+        </p:txBody>
+      </p:sp>
+    </p:spTree>
+    <p:extLst>
+      <p:ext uri="{BB962C8B-B14F-4D97-AF65-F5344CB8AC3E}">
+        <p14:creationId xmlns:p14="http://schemas.microsoft.com/office/powerpoint/2010/main" val="2968565018"/>
+      </p:ext>
+    </p:extLst>
+  </p:cSld>
+  <p:clrMapOvr>
+    <a:masterClrMapping/>
+  </p:clrMapOvr>
+</p:sld>
+</file>
+
+<file path=ppt/slides/slide4.xml><?xml version="1.0" encoding="utf-8"?>
+<p:sld xmlns:a="http://schemas.openxmlformats.org/drawingml/2006/main" xmlns:r="http://schemas.openxmlformats.org/officeDocument/2006/relationships" xmlns:p="http://schemas.openxmlformats.org/presentationml/2006/main">
+  <p:cSld>
+    <p:spTree>
+      <p:nvGrpSpPr>
+        <p:cNvPr id="1" name=""/>
+        <p:cNvGrpSpPr/>
+        <p:nvPr/>
+      </p:nvGrpSpPr>
+      <p:grpSpPr>
+        <a:xfrm>
+          <a:off x="0" y="0"/>
+          <a:ext cx="0" cy="0"/>
+          <a:chOff x="0" y="0"/>
+          <a:chExt cx="0" cy="0"/>
+        </a:xfrm>
+      </p:grpSpPr>
+      <p:sp>
+        <p:nvSpPr>
+          <p:cNvPr id="4" name="TextBox 3">
+            <a:extLst>
+              <a:ext uri="{FF2B5EF4-FFF2-40B4-BE49-F238E27FC236}">
+                <a16:creationId xmlns:a16="http://schemas.microsoft.com/office/drawing/2014/main" id="{959F4C1C-DFAB-4285-BFD0-0F4547AB49F1}"/>
+              </a:ext>
+            </a:extLst>
+          </p:cNvPr>
+          <p:cNvSpPr txBox="1"/>
+          <p:nvPr/>
+        </p:nvSpPr>
+        <p:spPr>
+          <a:xfrm>
+            <a:off x="2335763" y="688519"/>
+            <a:ext cx="7520473" cy="369332"/>
+          </a:xfrm>
+          <a:prstGeom prst="rect">
+            <a:avLst/>
+          </a:prstGeom>
+          <a:noFill/>
+        </p:spPr>
+        <p:txBody>
+          <a:bodyPr wrap="square" rtlCol="0">
+            <a:spAutoFit/>
+          </a:bodyPr>
+          <a:lstStyle/>
+          <a:p>
+            <a:pPr algn="ctr"/>
+            <a:r>
+              <a:rPr lang="en-US" dirty="0"/>
+              <a:t>Plant Waterer Server</a:t>
+            </a:r>
+          </a:p>
+        </p:txBody>
+      </p:sp>
+      <p:sp>
+        <p:nvSpPr>
+          <p:cNvPr id="5" name="Rectangle 4">
+            <a:extLst>
+              <a:ext uri="{FF2B5EF4-FFF2-40B4-BE49-F238E27FC236}">
+                <a16:creationId xmlns:a16="http://schemas.microsoft.com/office/drawing/2014/main" id="{890FDA78-8084-4087-A11B-BA970835D71D}"/>
+              </a:ext>
+            </a:extLst>
+          </p:cNvPr>
+          <p:cNvSpPr/>
+          <p:nvPr/>
+        </p:nvSpPr>
+        <p:spPr>
+          <a:xfrm>
+            <a:off x="1024812" y="1548883"/>
+            <a:ext cx="2621902" cy="4058816"/>
+          </a:xfrm>
+          <a:prstGeom prst="rect">
+            <a:avLst/>
+          </a:prstGeom>
+          <a:solidFill>
+            <a:schemeClr val="bg2"/>
+          </a:solidFill>
+        </p:spPr>
+        <p:style>
+          <a:lnRef idx="2">
+            <a:schemeClr val="accent1">
+              <a:shade val="50000"/>
+            </a:schemeClr>
+          </a:lnRef>
+          <a:fillRef idx="1">
+            <a:schemeClr val="accent1"/>
+          </a:fillRef>
+          <a:effectRef idx="0">
+            <a:schemeClr val="accent1"/>
+          </a:effectRef>
+          <a:fontRef idx="minor">
+            <a:schemeClr val="lt1"/>
+          </a:fontRef>
+        </p:style>
+        <p:txBody>
+          <a:bodyPr rtlCol="0" anchor="ctr"/>
+          <a:lstStyle/>
+          <a:p>
+            <a:pPr algn="ctr"/>
+            <a:endParaRPr lang="en-US"/>
+          </a:p>
+        </p:txBody>
+      </p:sp>
+      <p:sp>
+        <p:nvSpPr>
+          <p:cNvPr id="6" name="Rectangle 5">
+            <a:extLst>
+              <a:ext uri="{FF2B5EF4-FFF2-40B4-BE49-F238E27FC236}">
+                <a16:creationId xmlns:a16="http://schemas.microsoft.com/office/drawing/2014/main" id="{B7C2B2CB-ED07-490A-888E-3C43FA10E502}"/>
+              </a:ext>
+            </a:extLst>
+          </p:cNvPr>
+          <p:cNvSpPr/>
+          <p:nvPr/>
+        </p:nvSpPr>
+        <p:spPr>
+          <a:xfrm>
+            <a:off x="4785048" y="1548883"/>
+            <a:ext cx="2621902" cy="4058816"/>
+          </a:xfrm>
+          <a:prstGeom prst="rect">
+            <a:avLst/>
+          </a:prstGeom>
+          <a:solidFill>
+            <a:schemeClr val="bg2"/>
+          </a:solidFill>
+        </p:spPr>
+        <p:style>
+          <a:lnRef idx="2">
+            <a:schemeClr val="accent1">
+              <a:shade val="50000"/>
+            </a:schemeClr>
+          </a:lnRef>
+          <a:fillRef idx="1">
+            <a:schemeClr val="accent1"/>
+          </a:fillRef>
+          <a:effectRef idx="0">
+            <a:schemeClr val="accent1"/>
+          </a:effectRef>
+          <a:fontRef idx="minor">
+            <a:schemeClr val="lt1"/>
+          </a:fontRef>
+        </p:style>
+        <p:txBody>
+          <a:bodyPr rtlCol="0" anchor="ctr"/>
+          <a:lstStyle/>
+          <a:p>
+            <a:pPr algn="ctr"/>
+            <a:endParaRPr lang="en-US"/>
+          </a:p>
+        </p:txBody>
+      </p:sp>
+      <p:sp>
+        <p:nvSpPr>
+          <p:cNvPr id="15" name="Rectangle 14">
+            <a:hlinkClick r:id="rId2" action="ppaction://hlinksldjump"/>
+            <a:extLst>
+              <a:ext uri="{FF2B5EF4-FFF2-40B4-BE49-F238E27FC236}">
+                <a16:creationId xmlns:a16="http://schemas.microsoft.com/office/drawing/2014/main" id="{80DBFCFD-4C5B-4C97-8AF2-EB77D54DF65C}"/>
+              </a:ext>
+            </a:extLst>
+          </p:cNvPr>
+          <p:cNvSpPr/>
+          <p:nvPr/>
+        </p:nvSpPr>
+        <p:spPr>
+          <a:xfrm>
+            <a:off x="1024812" y="4587171"/>
+            <a:ext cx="2621900" cy="517848"/>
+          </a:xfrm>
+          <a:prstGeom prst="rect">
+            <a:avLst/>
+          </a:prstGeom>
+          <a:solidFill>
+            <a:schemeClr val="accent3"/>
+          </a:solidFill>
+        </p:spPr>
+        <p:style>
+          <a:lnRef idx="2">
+            <a:schemeClr val="accent1">
+              <a:shade val="50000"/>
+            </a:schemeClr>
+          </a:lnRef>
+          <a:fillRef idx="1">
+            <a:schemeClr val="accent1"/>
+          </a:fillRef>
+          <a:effectRef idx="0">
+            <a:schemeClr val="accent1"/>
+          </a:effectRef>
+          <a:fontRef idx="minor">
+            <a:schemeClr val="lt1"/>
+          </a:fontRef>
+        </p:style>
+        <p:txBody>
+          <a:bodyPr rtlCol="0" anchor="ctr"/>
+          <a:lstStyle/>
+          <a:p>
+            <a:pPr algn="ctr"/>
+            <a:r>
+              <a:rPr lang="en-US" dirty="0"/>
+              <a:t>Signal Strength</a:t>
+            </a:r>
+          </a:p>
+        </p:txBody>
+      </p:sp>
+      <p:sp>
+        <p:nvSpPr>
+          <p:cNvPr id="16" name="Rectangle 15">
+            <a:hlinkClick r:id="rId3" action="ppaction://hlinksldjump"/>
+            <a:extLst>
+              <a:ext uri="{FF2B5EF4-FFF2-40B4-BE49-F238E27FC236}">
+                <a16:creationId xmlns:a16="http://schemas.microsoft.com/office/drawing/2014/main" id="{E005A488-05A3-490E-979F-821E35D48E1D}"/>
+              </a:ext>
+            </a:extLst>
+          </p:cNvPr>
+          <p:cNvSpPr/>
+          <p:nvPr/>
+        </p:nvSpPr>
+        <p:spPr>
+          <a:xfrm>
+            <a:off x="1024812" y="5105019"/>
+            <a:ext cx="2621900" cy="517848"/>
+          </a:xfrm>
+          <a:prstGeom prst="rect">
+            <a:avLst/>
+          </a:prstGeom>
+          <a:solidFill>
+            <a:schemeClr val="accent3"/>
+          </a:solidFill>
+        </p:spPr>
+        <p:style>
+          <a:lnRef idx="2">
+            <a:schemeClr val="accent1">
+              <a:shade val="50000"/>
+            </a:schemeClr>
+          </a:lnRef>
+          <a:fillRef idx="1">
+            <a:schemeClr val="accent1"/>
+          </a:fillRef>
+          <a:effectRef idx="0">
+            <a:schemeClr val="accent1"/>
+          </a:effectRef>
+          <a:fontRef idx="minor">
+            <a:schemeClr val="lt1"/>
+          </a:fontRef>
+        </p:style>
+        <p:txBody>
+          <a:bodyPr rtlCol="0" anchor="ctr"/>
+          <a:lstStyle/>
+          <a:p>
+            <a:pPr algn="ctr"/>
+            <a:r>
+              <a:rPr lang="en-US" dirty="0"/>
+              <a:t>More Info</a:t>
+            </a:r>
+          </a:p>
+        </p:txBody>
+      </p:sp>
+      <p:sp>
+        <p:nvSpPr>
+          <p:cNvPr id="17" name="TextBox 16">
+            <a:extLst>
+              <a:ext uri="{FF2B5EF4-FFF2-40B4-BE49-F238E27FC236}">
+                <a16:creationId xmlns:a16="http://schemas.microsoft.com/office/drawing/2014/main" id="{BFDEA7D4-8E3A-46D8-A625-1FD30FCCE1E7}"/>
+              </a:ext>
+            </a:extLst>
+          </p:cNvPr>
+          <p:cNvSpPr txBox="1"/>
+          <p:nvPr/>
+        </p:nvSpPr>
+        <p:spPr>
+          <a:xfrm>
+            <a:off x="139959" y="167951"/>
+            <a:ext cx="2621900" cy="369332"/>
+          </a:xfrm>
+          <a:prstGeom prst="rect">
+            <a:avLst/>
+          </a:prstGeom>
+          <a:noFill/>
+        </p:spPr>
+        <p:txBody>
+          <a:bodyPr wrap="square" rtlCol="0">
+            <a:spAutoFit/>
+          </a:bodyPr>
+          <a:lstStyle/>
+          <a:p>
+            <a:r>
+              <a:rPr lang="en-US" dirty="0"/>
+              <a:t>Home Page</a:t>
+            </a:r>
+          </a:p>
+        </p:txBody>
+      </p:sp>
+      <p:sp>
+        <p:nvSpPr>
+          <p:cNvPr id="2" name="Oval 1">
+            <a:hlinkClick r:id="rId4" action="ppaction://hlinksldjump"/>
+            <a:extLst>
+              <a:ext uri="{FF2B5EF4-FFF2-40B4-BE49-F238E27FC236}">
+                <a16:creationId xmlns:a16="http://schemas.microsoft.com/office/drawing/2014/main" id="{44BC48E6-161B-2907-60CF-95D1A9DB64C4}"/>
+              </a:ext>
+            </a:extLst>
+          </p:cNvPr>
+          <p:cNvSpPr/>
+          <p:nvPr/>
+        </p:nvSpPr>
+        <p:spPr>
+          <a:xfrm>
+            <a:off x="5695949" y="3034719"/>
+            <a:ext cx="800100" cy="787981"/>
+          </a:xfrm>
+          <a:prstGeom prst="ellipse">
+            <a:avLst/>
+          </a:prstGeom>
+          <a:solidFill>
+            <a:schemeClr val="bg1"/>
+          </a:solidFill>
+          <a:ln>
+            <a:solidFill>
+              <a:schemeClr val="bg1">
+                <a:lumMod val="85000"/>
+              </a:schemeClr>
+            </a:solidFill>
+          </a:ln>
+        </p:spPr>
+        <p:style>
+          <a:lnRef idx="2">
+            <a:schemeClr val="accent1">
+              <a:shade val="50000"/>
+            </a:schemeClr>
+          </a:lnRef>
+          <a:fillRef idx="1">
+            <a:schemeClr val="accent1"/>
+          </a:fillRef>
+          <a:effectRef idx="0">
+            <a:schemeClr val="accent1"/>
+          </a:effectRef>
+          <a:fontRef idx="minor">
+            <a:schemeClr val="lt1"/>
+          </a:fontRef>
+        </p:style>
+        <p:txBody>
+          <a:bodyPr rtlCol="0" anchor="ctr"/>
+          <a:lstStyle/>
+          <a:p>
+            <a:pPr algn="ctr"/>
+            <a:endParaRPr lang="en-US"/>
+          </a:p>
+        </p:txBody>
+      </p:sp>
+      <p:sp>
+        <p:nvSpPr>
+          <p:cNvPr id="3" name="Plus Sign 2">
+            <a:extLst>
+              <a:ext uri="{FF2B5EF4-FFF2-40B4-BE49-F238E27FC236}">
+                <a16:creationId xmlns:a16="http://schemas.microsoft.com/office/drawing/2014/main" id="{537AE8F3-2DD5-9CF1-7E7D-FA535D7F730B}"/>
+              </a:ext>
+            </a:extLst>
+          </p:cNvPr>
+          <p:cNvSpPr/>
+          <p:nvPr/>
+        </p:nvSpPr>
+        <p:spPr>
+          <a:xfrm>
+            <a:off x="5924549" y="3247410"/>
+            <a:ext cx="342900" cy="362598"/>
+          </a:xfrm>
+          <a:prstGeom prst="mathPlus">
+            <a:avLst/>
+          </a:prstGeom>
+        </p:spPr>
+        <p:style>
+          <a:lnRef idx="2">
+            <a:schemeClr val="accent1">
+              <a:shade val="50000"/>
+            </a:schemeClr>
+          </a:lnRef>
+          <a:fillRef idx="1">
+            <a:schemeClr val="accent1"/>
+          </a:fillRef>
+          <a:effectRef idx="0">
+            <a:schemeClr val="accent1"/>
+          </a:effectRef>
+          <a:fontRef idx="minor">
+            <a:schemeClr val="lt1"/>
+          </a:fontRef>
+        </p:style>
+        <p:txBody>
+          <a:bodyPr rtlCol="0" anchor="ctr"/>
+          <a:lstStyle/>
+          <a:p>
+            <a:pPr algn="ctr"/>
+            <a:endParaRPr lang="en-US"/>
+          </a:p>
+        </p:txBody>
+      </p:sp>
+      <p:sp>
+        <p:nvSpPr>
+          <p:cNvPr id="19" name="Rectangle 18">
+            <a:hlinkClick r:id="rId5" action="ppaction://hlinksldjump"/>
+            <a:extLst>
+              <a:ext uri="{FF2B5EF4-FFF2-40B4-BE49-F238E27FC236}">
+                <a16:creationId xmlns:a16="http://schemas.microsoft.com/office/drawing/2014/main" id="{3BE5FDC9-DDF4-549B-53E7-ABA7BCD1C161}"/>
+              </a:ext>
+            </a:extLst>
+          </p:cNvPr>
+          <p:cNvSpPr/>
+          <p:nvPr/>
+        </p:nvSpPr>
+        <p:spPr>
+          <a:xfrm>
+            <a:off x="1024812" y="1557109"/>
+            <a:ext cx="2621900" cy="517848"/>
+          </a:xfrm>
+          <a:prstGeom prst="rect">
+            <a:avLst/>
+          </a:prstGeom>
+          <a:solidFill>
+            <a:schemeClr val="accent3"/>
+          </a:solidFill>
+        </p:spPr>
+        <p:style>
+          <a:lnRef idx="2">
+            <a:schemeClr val="accent1">
+              <a:shade val="50000"/>
+            </a:schemeClr>
+          </a:lnRef>
+          <a:fillRef idx="1">
+            <a:schemeClr val="accent1"/>
+          </a:fillRef>
+          <a:effectRef idx="0">
+            <a:schemeClr val="accent1"/>
+          </a:effectRef>
+          <a:fontRef idx="minor">
+            <a:schemeClr val="lt1"/>
+          </a:fontRef>
+        </p:style>
+        <p:txBody>
+          <a:bodyPr rtlCol="0" anchor="ctr"/>
+          <a:lstStyle/>
+          <a:p>
+            <a:pPr algn="ctr"/>
+            <a:r>
+              <a:rPr lang="en-US" dirty="0"/>
+              <a:t>Plant Name</a:t>
+            </a:r>
+          </a:p>
+        </p:txBody>
+      </p:sp>
+      <p:pic>
+        <p:nvPicPr>
+          <p:cNvPr id="20" name="Picture 19">
+            <a:extLst>
+              <a:ext uri="{FF2B5EF4-FFF2-40B4-BE49-F238E27FC236}">
+                <a16:creationId xmlns:a16="http://schemas.microsoft.com/office/drawing/2014/main" id="{FE0B02DF-031E-BFDD-A0D6-B56A9D2D4274}"/>
+              </a:ext>
+            </a:extLst>
+          </p:cNvPr>
+          <p:cNvPicPr>
+            <a:picLocks noChangeAspect="1"/>
+          </p:cNvPicPr>
+          <p:nvPr/>
+        </p:nvPicPr>
+        <p:blipFill>
+          <a:blip r:embed="rId6"/>
+          <a:stretch>
+            <a:fillRect/>
+          </a:stretch>
+        </p:blipFill>
+        <p:spPr>
+          <a:xfrm>
+            <a:off x="1045029" y="3086170"/>
+            <a:ext cx="2601683" cy="1473059"/>
+          </a:xfrm>
+          <a:prstGeom prst="rect">
+            <a:avLst/>
+          </a:prstGeom>
+        </p:spPr>
+      </p:pic>
+      <p:sp>
+        <p:nvSpPr>
+          <p:cNvPr id="18" name="Rectangle 17">
+            <a:hlinkClick r:id="rId7" action="ppaction://hlinksldjump"/>
+            <a:extLst>
+              <a:ext uri="{FF2B5EF4-FFF2-40B4-BE49-F238E27FC236}">
+                <a16:creationId xmlns:a16="http://schemas.microsoft.com/office/drawing/2014/main" id="{F0F560CD-2821-ED31-B333-986EE6B61966}"/>
+              </a:ext>
+            </a:extLst>
+          </p:cNvPr>
+          <p:cNvSpPr/>
+          <p:nvPr/>
+        </p:nvSpPr>
+        <p:spPr>
+          <a:xfrm>
+            <a:off x="1024812" y="2083183"/>
+            <a:ext cx="2621900" cy="517848"/>
+          </a:xfrm>
+          <a:prstGeom prst="rect">
+            <a:avLst/>
+          </a:prstGeom>
+          <a:solidFill>
+            <a:schemeClr val="accent3"/>
+          </a:solidFill>
+        </p:spPr>
+        <p:style>
+          <a:lnRef idx="2">
+            <a:schemeClr val="accent1">
+              <a:shade val="50000"/>
+            </a:schemeClr>
+          </a:lnRef>
+          <a:fillRef idx="1">
+            <a:schemeClr val="accent1"/>
+          </a:fillRef>
+          <a:effectRef idx="0">
+            <a:schemeClr val="accent1"/>
+          </a:effectRef>
+          <a:fontRef idx="minor">
+            <a:schemeClr val="lt1"/>
+          </a:fontRef>
+        </p:style>
+        <p:txBody>
+          <a:bodyPr rtlCol="0" anchor="ctr"/>
+          <a:lstStyle/>
+          <a:p>
+            <a:pPr algn="ctr"/>
+            <a:r>
+              <a:rPr lang="en-US" dirty="0"/>
+              <a:t>Soil Moisture Level</a:t>
+            </a:r>
+          </a:p>
+        </p:txBody>
+      </p:sp>
+      <p:sp>
+        <p:nvSpPr>
+          <p:cNvPr id="22" name="TextBox 21">
+            <a:extLst>
+              <a:ext uri="{FF2B5EF4-FFF2-40B4-BE49-F238E27FC236}">
+                <a16:creationId xmlns:a16="http://schemas.microsoft.com/office/drawing/2014/main" id="{D6A8E116-E23A-9A8F-176F-5CBFEA8CA97A}"/>
+              </a:ext>
+            </a:extLst>
+          </p:cNvPr>
+          <p:cNvSpPr txBox="1"/>
+          <p:nvPr/>
+        </p:nvSpPr>
+        <p:spPr>
+          <a:xfrm>
+            <a:off x="1024812" y="2613736"/>
+            <a:ext cx="2621900" cy="369332"/>
+          </a:xfrm>
+          <a:prstGeom prst="rect">
+            <a:avLst/>
+          </a:prstGeom>
+          <a:noFill/>
+        </p:spPr>
+        <p:txBody>
+          <a:bodyPr wrap="square">
+            <a:spAutoFit/>
+          </a:bodyPr>
+          <a:lstStyle/>
+          <a:p>
+            <a:pPr algn="ctr"/>
+            <a:r>
+              <a:rPr lang="en-US" dirty="0"/>
+              <a:t>Sunlight level</a:t>
+            </a:r>
+          </a:p>
+        </p:txBody>
+      </p:sp>
+    </p:spTree>
+    <p:extLst>
+      <p:ext uri="{BB962C8B-B14F-4D97-AF65-F5344CB8AC3E}">
+        <p14:creationId xmlns:p14="http://schemas.microsoft.com/office/powerpoint/2010/main" val="2977954285"/>
+      </p:ext>
+    </p:extLst>
+  </p:cSld>
+  <p:clrMapOvr>
+    <a:masterClrMapping/>
+  </p:clrMapOvr>
+</p:sld>
+</file>
+
+<file path=ppt/slides/slide5.xml><?xml version="1.0" encoding="utf-8"?>
+<p:sld xmlns:a="http://schemas.openxmlformats.org/drawingml/2006/main" xmlns:r="http://schemas.openxmlformats.org/officeDocument/2006/relationships" xmlns:p="http://schemas.openxmlformats.org/presentationml/2006/main">
+  <p:cSld>
+    <p:spTree>
+      <p:nvGrpSpPr>
+        <p:cNvPr id="1" name=""/>
+        <p:cNvGrpSpPr/>
+        <p:nvPr/>
+      </p:nvGrpSpPr>
+      <p:grpSpPr>
+        <a:xfrm>
+          <a:off x="0" y="0"/>
+          <a:ext cx="0" cy="0"/>
+          <a:chOff x="0" y="0"/>
+          <a:chExt cx="0" cy="0"/>
+        </a:xfrm>
+      </p:grpSpPr>
+      <p:sp>
+        <p:nvSpPr>
+          <p:cNvPr id="4" name="TextBox 3">
+            <a:extLst>
+              <a:ext uri="{FF2B5EF4-FFF2-40B4-BE49-F238E27FC236}">
+                <a16:creationId xmlns:a16="http://schemas.microsoft.com/office/drawing/2014/main" id="{959F4C1C-DFAB-4285-BFD0-0F4547AB49F1}"/>
+              </a:ext>
+            </a:extLst>
+          </p:cNvPr>
+          <p:cNvSpPr txBox="1"/>
+          <p:nvPr/>
+        </p:nvSpPr>
+        <p:spPr>
+          <a:xfrm>
+            <a:off x="2335763" y="688519"/>
+            <a:ext cx="7520473" cy="369332"/>
+          </a:xfrm>
+          <a:prstGeom prst="rect">
+            <a:avLst/>
+          </a:prstGeom>
+          <a:noFill/>
+        </p:spPr>
+        <p:txBody>
+          <a:bodyPr wrap="square" rtlCol="0">
+            <a:spAutoFit/>
+          </a:bodyPr>
+          <a:lstStyle/>
+          <a:p>
+            <a:pPr algn="ctr"/>
+            <a:r>
+              <a:rPr lang="en-US" dirty="0"/>
+              <a:t>Plant Waterer Server</a:t>
+            </a:r>
+          </a:p>
+        </p:txBody>
+      </p:sp>
+      <p:sp>
+        <p:nvSpPr>
+          <p:cNvPr id="5" name="Rectangle 4">
+            <a:extLst>
+              <a:ext uri="{FF2B5EF4-FFF2-40B4-BE49-F238E27FC236}">
+                <a16:creationId xmlns:a16="http://schemas.microsoft.com/office/drawing/2014/main" id="{890FDA78-8084-4087-A11B-BA970835D71D}"/>
+              </a:ext>
+            </a:extLst>
+          </p:cNvPr>
+          <p:cNvSpPr/>
+          <p:nvPr/>
+        </p:nvSpPr>
+        <p:spPr>
+          <a:xfrm>
+            <a:off x="1024812" y="1548883"/>
+            <a:ext cx="2621902" cy="4058816"/>
+          </a:xfrm>
+          <a:prstGeom prst="rect">
+            <a:avLst/>
+          </a:prstGeom>
+          <a:solidFill>
+            <a:schemeClr val="bg2"/>
+          </a:solidFill>
+        </p:spPr>
+        <p:style>
+          <a:lnRef idx="2">
+            <a:schemeClr val="accent1">
+              <a:shade val="50000"/>
+            </a:schemeClr>
+          </a:lnRef>
+          <a:fillRef idx="1">
+            <a:schemeClr val="accent1"/>
+          </a:fillRef>
+          <a:effectRef idx="0">
+            <a:schemeClr val="accent1"/>
+          </a:effectRef>
+          <a:fontRef idx="minor">
+            <a:schemeClr val="lt1"/>
+          </a:fontRef>
+        </p:style>
+        <p:txBody>
+          <a:bodyPr rtlCol="0" anchor="ctr"/>
+          <a:lstStyle/>
+          <a:p>
+            <a:pPr algn="ctr"/>
+            <a:endParaRPr lang="en-US"/>
+          </a:p>
+        </p:txBody>
+      </p:sp>
+      <p:sp>
+        <p:nvSpPr>
+          <p:cNvPr id="6" name="Rectangle 5">
+            <a:extLst>
+              <a:ext uri="{FF2B5EF4-FFF2-40B4-BE49-F238E27FC236}">
+                <a16:creationId xmlns:a16="http://schemas.microsoft.com/office/drawing/2014/main" id="{B7C2B2CB-ED07-490A-888E-3C43FA10E502}"/>
+              </a:ext>
+            </a:extLst>
+          </p:cNvPr>
+          <p:cNvSpPr/>
+          <p:nvPr/>
+        </p:nvSpPr>
+        <p:spPr>
+          <a:xfrm>
+            <a:off x="4785048" y="1548883"/>
+            <a:ext cx="2621902" cy="4058816"/>
+          </a:xfrm>
+          <a:prstGeom prst="rect">
+            <a:avLst/>
+          </a:prstGeom>
+          <a:solidFill>
+            <a:schemeClr val="bg2"/>
+          </a:solidFill>
+        </p:spPr>
+        <p:style>
+          <a:lnRef idx="2">
+            <a:schemeClr val="accent1">
+              <a:shade val="50000"/>
+            </a:schemeClr>
+          </a:lnRef>
+          <a:fillRef idx="1">
+            <a:schemeClr val="accent1"/>
+          </a:fillRef>
+          <a:effectRef idx="0">
+            <a:schemeClr val="accent1"/>
+          </a:effectRef>
+          <a:fontRef idx="minor">
+            <a:schemeClr val="lt1"/>
+          </a:fontRef>
+        </p:style>
+        <p:txBody>
+          <a:bodyPr rtlCol="0" anchor="ctr"/>
+          <a:lstStyle/>
+          <a:p>
+            <a:pPr algn="ctr"/>
+            <a:endParaRPr lang="en-US"/>
+          </a:p>
+        </p:txBody>
+      </p:sp>
+      <p:sp>
+        <p:nvSpPr>
+          <p:cNvPr id="16" name="Rectangle 15">
+            <a:hlinkClick r:id="rId2" action="ppaction://hlinksldjump"/>
+            <a:extLst>
+              <a:ext uri="{FF2B5EF4-FFF2-40B4-BE49-F238E27FC236}">
+                <a16:creationId xmlns:a16="http://schemas.microsoft.com/office/drawing/2014/main" id="{E005A488-05A3-490E-979F-821E35D48E1D}"/>
+              </a:ext>
+            </a:extLst>
+          </p:cNvPr>
+          <p:cNvSpPr/>
+          <p:nvPr/>
+        </p:nvSpPr>
+        <p:spPr>
+          <a:xfrm>
+            <a:off x="1024812" y="5105019"/>
+            <a:ext cx="2621900" cy="517848"/>
+          </a:xfrm>
+          <a:prstGeom prst="rect">
+            <a:avLst/>
+          </a:prstGeom>
+          <a:solidFill>
+            <a:schemeClr val="accent3"/>
+          </a:solidFill>
+        </p:spPr>
+        <p:style>
+          <a:lnRef idx="2">
+            <a:schemeClr val="accent1">
+              <a:shade val="50000"/>
+            </a:schemeClr>
+          </a:lnRef>
+          <a:fillRef idx="1">
+            <a:schemeClr val="accent1"/>
+          </a:fillRef>
+          <a:effectRef idx="0">
+            <a:schemeClr val="accent1"/>
+          </a:effectRef>
+          <a:fontRef idx="minor">
+            <a:schemeClr val="lt1"/>
+          </a:fontRef>
+        </p:style>
+        <p:txBody>
+          <a:bodyPr rtlCol="0" anchor="ctr"/>
+          <a:lstStyle/>
+          <a:p>
+            <a:pPr algn="ctr"/>
+            <a:r>
+              <a:rPr lang="en-US" dirty="0"/>
+              <a:t>More Info</a:t>
+            </a:r>
+          </a:p>
+        </p:txBody>
+      </p:sp>
+      <p:sp>
+        <p:nvSpPr>
+          <p:cNvPr id="17" name="TextBox 16">
+            <a:extLst>
+              <a:ext uri="{FF2B5EF4-FFF2-40B4-BE49-F238E27FC236}">
+                <a16:creationId xmlns:a16="http://schemas.microsoft.com/office/drawing/2014/main" id="{BFDEA7D4-8E3A-46D8-A625-1FD30FCCE1E7}"/>
+              </a:ext>
+            </a:extLst>
+          </p:cNvPr>
+          <p:cNvSpPr txBox="1"/>
+          <p:nvPr/>
+        </p:nvSpPr>
+        <p:spPr>
+          <a:xfrm>
+            <a:off x="139959" y="167951"/>
+            <a:ext cx="2621900" cy="369332"/>
+          </a:xfrm>
+          <a:prstGeom prst="rect">
+            <a:avLst/>
+          </a:prstGeom>
+          <a:noFill/>
+        </p:spPr>
+        <p:txBody>
+          <a:bodyPr wrap="square" rtlCol="0">
+            <a:spAutoFit/>
+          </a:bodyPr>
+          <a:lstStyle/>
+          <a:p>
+            <a:r>
+              <a:rPr lang="en-US" dirty="0"/>
+              <a:t>Home Page</a:t>
+            </a:r>
+          </a:p>
+        </p:txBody>
+      </p:sp>
+      <p:sp>
+        <p:nvSpPr>
+          <p:cNvPr id="2" name="Oval 1">
+            <a:hlinkClick r:id="rId3" action="ppaction://hlinksldjump"/>
+            <a:extLst>
+              <a:ext uri="{FF2B5EF4-FFF2-40B4-BE49-F238E27FC236}">
+                <a16:creationId xmlns:a16="http://schemas.microsoft.com/office/drawing/2014/main" id="{44BC48E6-161B-2907-60CF-95D1A9DB64C4}"/>
+              </a:ext>
+            </a:extLst>
+          </p:cNvPr>
+          <p:cNvSpPr/>
+          <p:nvPr/>
+        </p:nvSpPr>
+        <p:spPr>
+          <a:xfrm>
+            <a:off x="5695949" y="3034719"/>
+            <a:ext cx="800100" cy="787981"/>
+          </a:xfrm>
+          <a:prstGeom prst="ellipse">
+            <a:avLst/>
+          </a:prstGeom>
+          <a:solidFill>
+            <a:schemeClr val="bg1"/>
+          </a:solidFill>
+          <a:ln>
+            <a:solidFill>
+              <a:schemeClr val="bg1">
+                <a:lumMod val="85000"/>
+              </a:schemeClr>
+            </a:solidFill>
+          </a:ln>
+        </p:spPr>
+        <p:style>
+          <a:lnRef idx="2">
+            <a:schemeClr val="accent1">
+              <a:shade val="50000"/>
+            </a:schemeClr>
+          </a:lnRef>
+          <a:fillRef idx="1">
+            <a:schemeClr val="accent1"/>
+          </a:fillRef>
+          <a:effectRef idx="0">
+            <a:schemeClr val="accent1"/>
+          </a:effectRef>
+          <a:fontRef idx="minor">
+            <a:schemeClr val="lt1"/>
+          </a:fontRef>
+        </p:style>
+        <p:txBody>
+          <a:bodyPr rtlCol="0" anchor="ctr"/>
+          <a:lstStyle/>
+          <a:p>
+            <a:pPr algn="ctr"/>
+            <a:endParaRPr lang="en-US"/>
+          </a:p>
+        </p:txBody>
+      </p:sp>
+      <p:sp>
+        <p:nvSpPr>
+          <p:cNvPr id="3" name="Plus Sign 2">
+            <a:extLst>
+              <a:ext uri="{FF2B5EF4-FFF2-40B4-BE49-F238E27FC236}">
+                <a16:creationId xmlns:a16="http://schemas.microsoft.com/office/drawing/2014/main" id="{537AE8F3-2DD5-9CF1-7E7D-FA535D7F730B}"/>
+              </a:ext>
+            </a:extLst>
+          </p:cNvPr>
+          <p:cNvSpPr/>
+          <p:nvPr/>
+        </p:nvSpPr>
+        <p:spPr>
+          <a:xfrm>
+            <a:off x="5924549" y="3247410"/>
+            <a:ext cx="342900" cy="362598"/>
+          </a:xfrm>
+          <a:prstGeom prst="mathPlus">
+            <a:avLst/>
+          </a:prstGeom>
+        </p:spPr>
+        <p:style>
+          <a:lnRef idx="2">
+            <a:schemeClr val="accent1">
+              <a:shade val="50000"/>
+            </a:schemeClr>
+          </a:lnRef>
+          <a:fillRef idx="1">
+            <a:schemeClr val="accent1"/>
+          </a:fillRef>
+          <a:effectRef idx="0">
+            <a:schemeClr val="accent1"/>
+          </a:effectRef>
+          <a:fontRef idx="minor">
+            <a:schemeClr val="lt1"/>
+          </a:fontRef>
+        </p:style>
+        <p:txBody>
+          <a:bodyPr rtlCol="0" anchor="ctr"/>
+          <a:lstStyle/>
+          <a:p>
+            <a:pPr algn="ctr"/>
+            <a:endParaRPr lang="en-US"/>
+          </a:p>
+        </p:txBody>
+      </p:sp>
+      <p:sp>
+        <p:nvSpPr>
+          <p:cNvPr id="19" name="Rectangle 18">
+            <a:hlinkClick r:id="rId4" action="ppaction://hlinksldjump"/>
+            <a:extLst>
+              <a:ext uri="{FF2B5EF4-FFF2-40B4-BE49-F238E27FC236}">
+                <a16:creationId xmlns:a16="http://schemas.microsoft.com/office/drawing/2014/main" id="{3BE5FDC9-DDF4-549B-53E7-ABA7BCD1C161}"/>
+              </a:ext>
+            </a:extLst>
+          </p:cNvPr>
+          <p:cNvSpPr/>
+          <p:nvPr/>
+        </p:nvSpPr>
+        <p:spPr>
+          <a:xfrm>
+            <a:off x="1024812" y="1557109"/>
+            <a:ext cx="2621900" cy="517848"/>
+          </a:xfrm>
+          <a:prstGeom prst="rect">
+            <a:avLst/>
+          </a:prstGeom>
+          <a:solidFill>
+            <a:schemeClr val="accent3"/>
+          </a:solidFill>
+        </p:spPr>
+        <p:style>
+          <a:lnRef idx="2">
+            <a:schemeClr val="accent1">
+              <a:shade val="50000"/>
+            </a:schemeClr>
+          </a:lnRef>
+          <a:fillRef idx="1">
+            <a:schemeClr val="accent1"/>
+          </a:fillRef>
+          <a:effectRef idx="0">
+            <a:schemeClr val="accent1"/>
+          </a:effectRef>
+          <a:fontRef idx="minor">
+            <a:schemeClr val="lt1"/>
+          </a:fontRef>
+        </p:style>
+        <p:txBody>
+          <a:bodyPr rtlCol="0" anchor="ctr"/>
+          <a:lstStyle/>
+          <a:p>
+            <a:pPr algn="ctr"/>
+            <a:r>
+              <a:rPr lang="en-US" dirty="0"/>
+              <a:t>Plant Name</a:t>
+            </a:r>
+          </a:p>
+        </p:txBody>
+      </p:sp>
+      <p:pic>
+        <p:nvPicPr>
+          <p:cNvPr id="20" name="Picture 19">
+            <a:extLst>
+              <a:ext uri="{FF2B5EF4-FFF2-40B4-BE49-F238E27FC236}">
+                <a16:creationId xmlns:a16="http://schemas.microsoft.com/office/drawing/2014/main" id="{FE0B02DF-031E-BFDD-A0D6-B56A9D2D4274}"/>
+              </a:ext>
+            </a:extLst>
+          </p:cNvPr>
+          <p:cNvPicPr>
+            <a:picLocks noChangeAspect="1"/>
+          </p:cNvPicPr>
+          <p:nvPr/>
+        </p:nvPicPr>
+        <p:blipFill>
+          <a:blip r:embed="rId5"/>
+          <a:stretch>
+            <a:fillRect/>
+          </a:stretch>
+        </p:blipFill>
+        <p:spPr>
+          <a:xfrm>
+            <a:off x="1045029" y="3631960"/>
+            <a:ext cx="2601683" cy="1473059"/>
+          </a:xfrm>
+          <a:prstGeom prst="rect">
+            <a:avLst/>
+          </a:prstGeom>
+        </p:spPr>
+      </p:pic>
+      <p:sp>
+        <p:nvSpPr>
+          <p:cNvPr id="18" name="Rectangle 17">
+            <a:hlinkClick r:id="rId6" action="ppaction://hlinksldjump"/>
+            <a:extLst>
+              <a:ext uri="{FF2B5EF4-FFF2-40B4-BE49-F238E27FC236}">
+                <a16:creationId xmlns:a16="http://schemas.microsoft.com/office/drawing/2014/main" id="{F0F560CD-2821-ED31-B333-986EE6B61966}"/>
+              </a:ext>
+            </a:extLst>
+          </p:cNvPr>
+          <p:cNvSpPr/>
+          <p:nvPr/>
+        </p:nvSpPr>
+        <p:spPr>
+          <a:xfrm>
+            <a:off x="1024812" y="2083183"/>
+            <a:ext cx="2621900" cy="517848"/>
+          </a:xfrm>
+          <a:prstGeom prst="rect">
+            <a:avLst/>
+          </a:prstGeom>
+          <a:solidFill>
+            <a:schemeClr val="accent3"/>
+          </a:solidFill>
+        </p:spPr>
+        <p:style>
+          <a:lnRef idx="2">
+            <a:schemeClr val="accent1">
+              <a:shade val="50000"/>
+            </a:schemeClr>
+          </a:lnRef>
+          <a:fillRef idx="1">
+            <a:schemeClr val="accent1"/>
+          </a:fillRef>
+          <a:effectRef idx="0">
+            <a:schemeClr val="accent1"/>
+          </a:effectRef>
+          <a:fontRef idx="minor">
+            <a:schemeClr val="lt1"/>
+          </a:fontRef>
+        </p:style>
+        <p:txBody>
+          <a:bodyPr rtlCol="0" anchor="ctr"/>
+          <a:lstStyle/>
+          <a:p>
+            <a:pPr algn="ctr"/>
+            <a:r>
+              <a:rPr lang="en-US" dirty="0"/>
+              <a:t>Soil Moisture Level</a:t>
+            </a:r>
+          </a:p>
+        </p:txBody>
+      </p:sp>
+      <p:sp>
+        <p:nvSpPr>
+          <p:cNvPr id="14" name="Rectangle 13">
+            <a:hlinkClick r:id="rId7" action="ppaction://hlinksldjump"/>
+            <a:extLst>
+              <a:ext uri="{FF2B5EF4-FFF2-40B4-BE49-F238E27FC236}">
+                <a16:creationId xmlns:a16="http://schemas.microsoft.com/office/drawing/2014/main" id="{2CD03359-3D73-0D99-21D4-D883BEB82066}"/>
+              </a:ext>
+            </a:extLst>
+          </p:cNvPr>
+          <p:cNvSpPr/>
+          <p:nvPr/>
+        </p:nvSpPr>
+        <p:spPr>
+          <a:xfrm>
+            <a:off x="1024812" y="2609257"/>
+            <a:ext cx="2621900" cy="517848"/>
+          </a:xfrm>
+          <a:prstGeom prst="rect">
+            <a:avLst/>
+          </a:prstGeom>
+          <a:solidFill>
+            <a:schemeClr val="accent3"/>
+          </a:solidFill>
+        </p:spPr>
+        <p:style>
+          <a:lnRef idx="2">
+            <a:schemeClr val="accent1">
+              <a:shade val="50000"/>
+            </a:schemeClr>
+          </a:lnRef>
+          <a:fillRef idx="1">
+            <a:schemeClr val="accent1"/>
+          </a:fillRef>
+          <a:effectRef idx="0">
+            <a:schemeClr val="accent1"/>
+          </a:effectRef>
+          <a:fontRef idx="minor">
+            <a:schemeClr val="lt1"/>
+          </a:fontRef>
+        </p:style>
+        <p:txBody>
+          <a:bodyPr rtlCol="0" anchor="ctr"/>
+          <a:lstStyle/>
+          <a:p>
+            <a:pPr algn="ctr"/>
+            <a:r>
+              <a:rPr lang="en-US" dirty="0"/>
+              <a:t>Sunlight level</a:t>
+            </a:r>
+          </a:p>
+        </p:txBody>
+      </p:sp>
+      <p:sp>
+        <p:nvSpPr>
+          <p:cNvPr id="21" name="TextBox 20">
+            <a:extLst>
+              <a:ext uri="{FF2B5EF4-FFF2-40B4-BE49-F238E27FC236}">
+                <a16:creationId xmlns:a16="http://schemas.microsoft.com/office/drawing/2014/main" id="{6021EFB5-8985-F5D5-093B-239C115E3539}"/>
+              </a:ext>
+            </a:extLst>
+          </p:cNvPr>
+          <p:cNvSpPr txBox="1"/>
+          <p:nvPr/>
+        </p:nvSpPr>
+        <p:spPr>
+          <a:xfrm>
+            <a:off x="1024813" y="3133717"/>
+            <a:ext cx="2621900" cy="369332"/>
+          </a:xfrm>
+          <a:prstGeom prst="rect">
+            <a:avLst/>
+          </a:prstGeom>
+          <a:noFill/>
+        </p:spPr>
+        <p:txBody>
+          <a:bodyPr wrap="square">
+            <a:spAutoFit/>
+          </a:bodyPr>
+          <a:lstStyle/>
+          <a:p>
+            <a:pPr algn="ctr"/>
+            <a:r>
+              <a:rPr lang="en-US" dirty="0"/>
+              <a:t>Signal Strength</a:t>
+            </a:r>
+          </a:p>
+        </p:txBody>
+      </p:sp>
+    </p:spTree>
+    <p:extLst>
+      <p:ext uri="{BB962C8B-B14F-4D97-AF65-F5344CB8AC3E}">
+        <p14:creationId xmlns:p14="http://schemas.microsoft.com/office/powerpoint/2010/main" val="721781790"/>
+      </p:ext>
+    </p:extLst>
+  </p:cSld>
+  <p:clrMapOvr>
+    <a:masterClrMapping/>
+  </p:clrMapOvr>
+</p:sld>
+</file>
+
+<file path=ppt/slides/slide6.xml><?xml version="1.0" encoding="utf-8"?>
+<p:sld xmlns:a="http://schemas.openxmlformats.org/drawingml/2006/main" xmlns:r="http://schemas.openxmlformats.org/officeDocument/2006/relationships" xmlns:p="http://schemas.openxmlformats.org/presentationml/2006/main">
+  <p:cSld>
+    <p:spTree>
+      <p:nvGrpSpPr>
+        <p:cNvPr id="1" name=""/>
+        <p:cNvGrpSpPr/>
+        <p:nvPr/>
+      </p:nvGrpSpPr>
+      <p:grpSpPr>
+        <a:xfrm>
+          <a:off x="0" y="0"/>
+          <a:ext cx="0" cy="0"/>
+          <a:chOff x="0" y="0"/>
+          <a:chExt cx="0" cy="0"/>
+        </a:xfrm>
+      </p:grpSpPr>
+      <p:sp>
+        <p:nvSpPr>
+          <p:cNvPr id="6" name="Rectangle 5">
+            <a:extLst>
+              <a:ext uri="{FF2B5EF4-FFF2-40B4-BE49-F238E27FC236}">
+                <a16:creationId xmlns:a16="http://schemas.microsoft.com/office/drawing/2014/main" id="{098A2905-9120-F380-8F20-D94912E8FA2C}"/>
+              </a:ext>
+            </a:extLst>
+          </p:cNvPr>
+          <p:cNvSpPr/>
+          <p:nvPr/>
+        </p:nvSpPr>
+        <p:spPr>
+          <a:xfrm>
+            <a:off x="3750906" y="783772"/>
+            <a:ext cx="4273420" cy="5896946"/>
+          </a:xfrm>
+          <a:prstGeom prst="rect">
+            <a:avLst/>
+          </a:prstGeom>
+          <a:solidFill>
+            <a:schemeClr val="bg2">
+              <a:lumMod val="90000"/>
+            </a:schemeClr>
+          </a:solidFill>
+        </p:spPr>
+        <p:style>
+          <a:lnRef idx="2">
+            <a:schemeClr val="accent1">
+              <a:shade val="50000"/>
+            </a:schemeClr>
+          </a:lnRef>
+          <a:fillRef idx="1">
+            <a:schemeClr val="accent1"/>
+          </a:fillRef>
+          <a:effectRef idx="0">
+            <a:schemeClr val="accent1"/>
+          </a:effectRef>
+          <a:fontRef idx="minor">
+            <a:schemeClr val="lt1"/>
+          </a:fontRef>
+        </p:style>
+        <p:txBody>
+          <a:bodyPr rtlCol="0" anchor="ctr"/>
+          <a:lstStyle/>
+          <a:p>
+            <a:pPr algn="ctr"/>
+            <a:endParaRPr lang="en-US"/>
+          </a:p>
+        </p:txBody>
+      </p:sp>
+      <p:sp>
+        <p:nvSpPr>
+          <p:cNvPr id="2" name="TextBox 1">
+            <a:extLst>
+              <a:ext uri="{FF2B5EF4-FFF2-40B4-BE49-F238E27FC236}">
+                <a16:creationId xmlns:a16="http://schemas.microsoft.com/office/drawing/2014/main" id="{927CF708-F48C-E771-0FE2-BA29B2B88B4E}"/>
+              </a:ext>
+            </a:extLst>
+          </p:cNvPr>
+          <p:cNvSpPr txBox="1"/>
+          <p:nvPr/>
+        </p:nvSpPr>
+        <p:spPr>
+          <a:xfrm>
+            <a:off x="139959" y="167951"/>
+            <a:ext cx="2621900" cy="369332"/>
+          </a:xfrm>
+          <a:prstGeom prst="rect">
+            <a:avLst/>
+          </a:prstGeom>
+          <a:noFill/>
+        </p:spPr>
+        <p:txBody>
+          <a:bodyPr wrap="square" rtlCol="0">
+            <a:spAutoFit/>
+          </a:bodyPr>
+          <a:lstStyle/>
+          <a:p>
+            <a:r>
+              <a:rPr lang="en-US" dirty="0"/>
+              <a:t>Sensor Add Page</a:t>
+            </a:r>
+          </a:p>
+        </p:txBody>
+      </p:sp>
+      <p:sp>
+        <p:nvSpPr>
+          <p:cNvPr id="3" name="TextBox 2">
+            <a:extLst>
+              <a:ext uri="{FF2B5EF4-FFF2-40B4-BE49-F238E27FC236}">
+                <a16:creationId xmlns:a16="http://schemas.microsoft.com/office/drawing/2014/main" id="{9C6ECDBF-81CF-1BCF-DFD8-527ECF447C6B}"/>
+              </a:ext>
+            </a:extLst>
+          </p:cNvPr>
+          <p:cNvSpPr txBox="1"/>
+          <p:nvPr/>
+        </p:nvSpPr>
+        <p:spPr>
+          <a:xfrm>
+            <a:off x="4215882" y="1362269"/>
+            <a:ext cx="1483567" cy="369332"/>
+          </a:xfrm>
+          <a:prstGeom prst="rect">
+            <a:avLst/>
+          </a:prstGeom>
+          <a:noFill/>
+        </p:spPr>
+        <p:txBody>
+          <a:bodyPr wrap="square" rtlCol="0">
+            <a:spAutoFit/>
+          </a:bodyPr>
+          <a:lstStyle/>
+          <a:p>
+            <a:r>
+              <a:rPr lang="en-US" dirty="0"/>
+              <a:t>Plant Name:</a:t>
+            </a:r>
+          </a:p>
+        </p:txBody>
+      </p:sp>
+      <p:sp>
+        <p:nvSpPr>
+          <p:cNvPr id="4" name="TextBox 3">
+            <a:extLst>
+              <a:ext uri="{FF2B5EF4-FFF2-40B4-BE49-F238E27FC236}">
+                <a16:creationId xmlns:a16="http://schemas.microsoft.com/office/drawing/2014/main" id="{764B69F9-6F1F-0E2A-2331-C9144CD62459}"/>
+              </a:ext>
+            </a:extLst>
+          </p:cNvPr>
+          <p:cNvSpPr txBox="1"/>
+          <p:nvPr/>
+        </p:nvSpPr>
+        <p:spPr>
+          <a:xfrm>
+            <a:off x="4215881" y="1692142"/>
+            <a:ext cx="1483567" cy="369332"/>
+          </a:xfrm>
+          <a:prstGeom prst="rect">
+            <a:avLst/>
+          </a:prstGeom>
+          <a:noFill/>
+        </p:spPr>
+        <p:txBody>
+          <a:bodyPr wrap="square" rtlCol="0">
+            <a:spAutoFit/>
+          </a:bodyPr>
+          <a:lstStyle/>
+          <a:p>
+            <a:r>
+              <a:rPr lang="en-US" dirty="0"/>
+              <a:t>Date:</a:t>
+            </a:r>
+          </a:p>
+        </p:txBody>
+      </p:sp>
+      <p:sp>
+        <p:nvSpPr>
+          <p:cNvPr id="5" name="TextBox 4">
+            <a:extLst>
+              <a:ext uri="{FF2B5EF4-FFF2-40B4-BE49-F238E27FC236}">
+                <a16:creationId xmlns:a16="http://schemas.microsoft.com/office/drawing/2014/main" id="{CD1C2B88-466A-01AF-B629-3AAC0100B789}"/>
+              </a:ext>
+            </a:extLst>
+          </p:cNvPr>
+          <p:cNvSpPr txBox="1"/>
+          <p:nvPr/>
+        </p:nvSpPr>
+        <p:spPr>
+          <a:xfrm>
+            <a:off x="5044749" y="2804638"/>
+            <a:ext cx="1685730" cy="369332"/>
+          </a:xfrm>
+          <a:prstGeom prst="rect">
+            <a:avLst/>
+          </a:prstGeom>
+          <a:noFill/>
+        </p:spPr>
+        <p:txBody>
+          <a:bodyPr wrap="square" rtlCol="0">
+            <a:spAutoFit/>
+          </a:bodyPr>
+          <a:lstStyle/>
+          <a:p>
+            <a:r>
+              <a:rPr lang="en-US" dirty="0"/>
+              <a:t>Photo of Plant:</a:t>
+            </a:r>
+          </a:p>
+        </p:txBody>
+      </p:sp>
+      <p:sp>
+        <p:nvSpPr>
+          <p:cNvPr id="7" name="TextBox 6">
+            <a:extLst>
+              <a:ext uri="{FF2B5EF4-FFF2-40B4-BE49-F238E27FC236}">
+                <a16:creationId xmlns:a16="http://schemas.microsoft.com/office/drawing/2014/main" id="{A7AF4386-70E3-BB3A-67E7-68611ABDC026}"/>
+              </a:ext>
+            </a:extLst>
+          </p:cNvPr>
+          <p:cNvSpPr txBox="1"/>
+          <p:nvPr/>
+        </p:nvSpPr>
+        <p:spPr>
+          <a:xfrm>
+            <a:off x="4215881" y="2022015"/>
+            <a:ext cx="1483567" cy="369332"/>
+          </a:xfrm>
+          <a:prstGeom prst="rect">
+            <a:avLst/>
+          </a:prstGeom>
+          <a:noFill/>
+        </p:spPr>
+        <p:txBody>
+          <a:bodyPr wrap="square" rtlCol="0">
+            <a:spAutoFit/>
+          </a:bodyPr>
+          <a:lstStyle/>
+          <a:p>
+            <a:r>
+              <a:rPr lang="en-US" dirty="0"/>
+              <a:t>IP Address:</a:t>
+            </a:r>
+          </a:p>
+        </p:txBody>
+      </p:sp>
+      <p:grpSp>
+        <p:nvGrpSpPr>
+          <p:cNvPr id="17" name="Group 16">
+            <a:extLst>
+              <a:ext uri="{FF2B5EF4-FFF2-40B4-BE49-F238E27FC236}">
+                <a16:creationId xmlns:a16="http://schemas.microsoft.com/office/drawing/2014/main" id="{C6118141-D4F3-FDE9-2CE5-A63190AAA9F8}"/>
+              </a:ext>
+            </a:extLst>
+          </p:cNvPr>
+          <p:cNvGrpSpPr/>
+          <p:nvPr/>
+        </p:nvGrpSpPr>
+        <p:grpSpPr>
+          <a:xfrm>
+            <a:off x="4907121" y="3333147"/>
+            <a:ext cx="1960987" cy="1705975"/>
+            <a:chOff x="4329404" y="2760679"/>
+            <a:chExt cx="1960987" cy="1705975"/>
+          </a:xfrm>
+        </p:grpSpPr>
+        <p:sp>
+          <p:nvSpPr>
+            <p:cNvPr id="8" name="Rectangle 7">
+              <a:extLst>
+                <a:ext uri="{FF2B5EF4-FFF2-40B4-BE49-F238E27FC236}">
+                  <a16:creationId xmlns:a16="http://schemas.microsoft.com/office/drawing/2014/main" id="{444889A5-9160-FD3D-750D-81CB501E9C08}"/>
+                </a:ext>
+              </a:extLst>
+            </p:cNvPr>
+            <p:cNvSpPr/>
+            <p:nvPr/>
+          </p:nvSpPr>
+          <p:spPr>
+            <a:xfrm>
+              <a:off x="4329404" y="2760679"/>
+              <a:ext cx="1960987" cy="1705975"/>
+            </a:xfrm>
+            <a:prstGeom prst="rect">
+              <a:avLst/>
+            </a:prstGeom>
+            <a:solidFill>
+              <a:schemeClr val="bg1"/>
+            </a:solidFill>
+          </p:spPr>
+          <p:style>
+            <a:lnRef idx="2">
+              <a:schemeClr val="accent1">
+                <a:shade val="50000"/>
+              </a:schemeClr>
+            </a:lnRef>
+            <a:fillRef idx="1">
+              <a:schemeClr val="accent1"/>
+            </a:fillRef>
+            <a:effectRef idx="0">
+              <a:schemeClr val="accent1"/>
+            </a:effectRef>
+            <a:fontRef idx="minor">
+              <a:schemeClr val="lt1"/>
+            </a:fontRef>
+          </p:style>
+          <p:txBody>
+            <a:bodyPr rtlCol="0" anchor="ctr"/>
+            <a:lstStyle/>
+            <a:p>
+              <a:pPr algn="ctr"/>
+              <a:endParaRPr lang="en-US"/>
+            </a:p>
+          </p:txBody>
+        </p:sp>
+        <p:grpSp>
+          <p:nvGrpSpPr>
+            <p:cNvPr id="9" name="Group 8">
+              <a:extLst>
+                <a:ext uri="{FF2B5EF4-FFF2-40B4-BE49-F238E27FC236}">
+                  <a16:creationId xmlns:a16="http://schemas.microsoft.com/office/drawing/2014/main" id="{D0C6D358-2845-72DE-8535-CD454E261699}"/>
+                </a:ext>
+              </a:extLst>
+            </p:cNvPr>
+            <p:cNvGrpSpPr/>
+            <p:nvPr/>
+          </p:nvGrpSpPr>
+          <p:grpSpPr>
+            <a:xfrm>
+              <a:off x="4909847" y="3219676"/>
+              <a:ext cx="800100" cy="787981"/>
+              <a:chOff x="5695949" y="3034719"/>
+              <a:chExt cx="800100" cy="787981"/>
+            </a:xfrm>
+          </p:grpSpPr>
+          <p:sp>
+            <p:nvSpPr>
+              <p:cNvPr id="10" name="Oval 9">
+                <a:extLst>
+                  <a:ext uri="{FF2B5EF4-FFF2-40B4-BE49-F238E27FC236}">
+                    <a16:creationId xmlns:a16="http://schemas.microsoft.com/office/drawing/2014/main" id="{109647A6-E6CD-F413-EC8E-4888BC3288C2}"/>
+                  </a:ext>
+                </a:extLst>
+              </p:cNvPr>
+              <p:cNvSpPr/>
+              <p:nvPr/>
+            </p:nvSpPr>
+            <p:spPr>
+              <a:xfrm>
+                <a:off x="5695949" y="3034719"/>
+                <a:ext cx="800100" cy="787981"/>
+              </a:xfrm>
+              <a:prstGeom prst="ellipse">
+                <a:avLst/>
+              </a:prstGeom>
+              <a:solidFill>
+                <a:schemeClr val="bg1"/>
+              </a:solidFill>
+              <a:ln>
+                <a:solidFill>
+                  <a:schemeClr val="bg1">
+                    <a:lumMod val="85000"/>
+                  </a:schemeClr>
+                </a:solidFill>
+              </a:ln>
+            </p:spPr>
+            <p:style>
+              <a:lnRef idx="2">
+                <a:schemeClr val="accent1">
+                  <a:shade val="50000"/>
+                </a:schemeClr>
+              </a:lnRef>
+              <a:fillRef idx="1">
+                <a:schemeClr val="accent1"/>
+              </a:fillRef>
+              <a:effectRef idx="0">
+                <a:schemeClr val="accent1"/>
+              </a:effectRef>
+              <a:fontRef idx="minor">
+                <a:schemeClr val="lt1"/>
+              </a:fontRef>
+            </p:style>
+            <p:txBody>
+              <a:bodyPr rtlCol="0" anchor="ctr"/>
+              <a:lstStyle/>
+              <a:p>
+                <a:pPr algn="ctr"/>
+                <a:endParaRPr lang="en-US"/>
+              </a:p>
+            </p:txBody>
+          </p:sp>
+          <p:sp>
+            <p:nvSpPr>
+              <p:cNvPr id="11" name="Plus Sign 10">
+                <a:extLst>
+                  <a:ext uri="{FF2B5EF4-FFF2-40B4-BE49-F238E27FC236}">
+                    <a16:creationId xmlns:a16="http://schemas.microsoft.com/office/drawing/2014/main" id="{0A242318-4AEE-BA5B-375B-28480C95DEA2}"/>
+                  </a:ext>
+                </a:extLst>
+              </p:cNvPr>
+              <p:cNvSpPr/>
+              <p:nvPr/>
+            </p:nvSpPr>
+            <p:spPr>
+              <a:xfrm>
+                <a:off x="5924549" y="3247410"/>
+                <a:ext cx="342900" cy="362598"/>
+              </a:xfrm>
+              <a:prstGeom prst="mathPlus">
+                <a:avLst/>
+              </a:prstGeom>
+            </p:spPr>
+            <p:style>
+              <a:lnRef idx="2">
+                <a:schemeClr val="accent1">
+                  <a:shade val="50000"/>
+                </a:schemeClr>
+              </a:lnRef>
+              <a:fillRef idx="1">
+                <a:schemeClr val="accent1"/>
+              </a:fillRef>
+              <a:effectRef idx="0">
+                <a:schemeClr val="accent1"/>
+              </a:effectRef>
+              <a:fontRef idx="minor">
+                <a:schemeClr val="lt1"/>
+              </a:fontRef>
+            </p:style>
+            <p:txBody>
+              <a:bodyPr rtlCol="0" anchor="ctr"/>
+              <a:lstStyle/>
+              <a:p>
+                <a:pPr algn="ctr"/>
+                <a:endParaRPr lang="en-US"/>
+              </a:p>
+            </p:txBody>
+          </p:sp>
+        </p:grpSp>
+      </p:grpSp>
+      <p:sp>
+        <p:nvSpPr>
+          <p:cNvPr id="12" name="Rectangle 11">
+            <a:extLst>
+              <a:ext uri="{FF2B5EF4-FFF2-40B4-BE49-F238E27FC236}">
+                <a16:creationId xmlns:a16="http://schemas.microsoft.com/office/drawing/2014/main" id="{B42CAC1F-B95F-EE87-0410-9D28DCBFC9D0}"/>
+              </a:ext>
+            </a:extLst>
+          </p:cNvPr>
+          <p:cNvSpPr/>
+          <p:nvPr/>
+        </p:nvSpPr>
+        <p:spPr>
+          <a:xfrm>
+            <a:off x="5788090" y="1418834"/>
+            <a:ext cx="1960987" cy="256201"/>
+          </a:xfrm>
+          <a:prstGeom prst="rect">
+            <a:avLst/>
+          </a:prstGeom>
+          <a:solidFill>
+            <a:schemeClr val="bg1"/>
+          </a:solidFill>
+        </p:spPr>
+        <p:style>
+          <a:lnRef idx="2">
+            <a:schemeClr val="accent1">
+              <a:shade val="50000"/>
+            </a:schemeClr>
+          </a:lnRef>
+          <a:fillRef idx="1">
+            <a:schemeClr val="accent1"/>
+          </a:fillRef>
+          <a:effectRef idx="0">
+            <a:schemeClr val="accent1"/>
+          </a:effectRef>
+          <a:fontRef idx="minor">
+            <a:schemeClr val="lt1"/>
+          </a:fontRef>
+        </p:style>
+        <p:txBody>
+          <a:bodyPr rtlCol="0" anchor="ctr"/>
+          <a:lstStyle/>
+          <a:p>
+            <a:pPr algn="ctr"/>
+            <a:endParaRPr lang="en-US" dirty="0"/>
+          </a:p>
+        </p:txBody>
+      </p:sp>
+      <p:sp>
+        <p:nvSpPr>
+          <p:cNvPr id="13" name="Rectangle 12">
+            <a:extLst>
+              <a:ext uri="{FF2B5EF4-FFF2-40B4-BE49-F238E27FC236}">
+                <a16:creationId xmlns:a16="http://schemas.microsoft.com/office/drawing/2014/main" id="{A5011ED9-AACD-CBF1-2E4A-162BFC360597}"/>
+              </a:ext>
+            </a:extLst>
+          </p:cNvPr>
+          <p:cNvSpPr/>
+          <p:nvPr/>
+        </p:nvSpPr>
+        <p:spPr>
+          <a:xfrm>
+            <a:off x="5788090" y="1754081"/>
+            <a:ext cx="1960987" cy="256201"/>
+          </a:xfrm>
+          <a:prstGeom prst="rect">
+            <a:avLst/>
+          </a:prstGeom>
+          <a:solidFill>
+            <a:schemeClr val="bg1"/>
+          </a:solidFill>
+        </p:spPr>
+        <p:style>
+          <a:lnRef idx="2">
+            <a:schemeClr val="accent1">
+              <a:shade val="50000"/>
+            </a:schemeClr>
+          </a:lnRef>
+          <a:fillRef idx="1">
+            <a:schemeClr val="accent1"/>
+          </a:fillRef>
+          <a:effectRef idx="0">
+            <a:schemeClr val="accent1"/>
+          </a:effectRef>
+          <a:fontRef idx="minor">
+            <a:schemeClr val="lt1"/>
+          </a:fontRef>
+        </p:style>
+        <p:txBody>
+          <a:bodyPr rtlCol="0" anchor="ctr"/>
+          <a:lstStyle/>
+          <a:p>
+            <a:pPr algn="ctr"/>
+            <a:endParaRPr lang="en-US" dirty="0"/>
+          </a:p>
+        </p:txBody>
+      </p:sp>
+      <p:sp>
+        <p:nvSpPr>
+          <p:cNvPr id="14" name="Rectangle 13">
+            <a:extLst>
+              <a:ext uri="{FF2B5EF4-FFF2-40B4-BE49-F238E27FC236}">
+                <a16:creationId xmlns:a16="http://schemas.microsoft.com/office/drawing/2014/main" id="{D77E5327-86B8-79BE-75E0-82246C15F7DF}"/>
+              </a:ext>
+            </a:extLst>
+          </p:cNvPr>
+          <p:cNvSpPr/>
+          <p:nvPr/>
+        </p:nvSpPr>
+        <p:spPr>
+          <a:xfrm>
+            <a:off x="5788090" y="2083422"/>
+            <a:ext cx="1960987" cy="256201"/>
+          </a:xfrm>
+          <a:prstGeom prst="rect">
+            <a:avLst/>
+          </a:prstGeom>
+          <a:solidFill>
+            <a:schemeClr val="bg1"/>
+          </a:solidFill>
+        </p:spPr>
+        <p:style>
+          <a:lnRef idx="2">
+            <a:schemeClr val="accent1">
+              <a:shade val="50000"/>
+            </a:schemeClr>
+          </a:lnRef>
+          <a:fillRef idx="1">
+            <a:schemeClr val="accent1"/>
+          </a:fillRef>
+          <a:effectRef idx="0">
+            <a:schemeClr val="accent1"/>
+          </a:effectRef>
+          <a:fontRef idx="minor">
+            <a:schemeClr val="lt1"/>
+          </a:fontRef>
+        </p:style>
+        <p:txBody>
+          <a:bodyPr rtlCol="0" anchor="ctr"/>
+          <a:lstStyle/>
+          <a:p>
+            <a:pPr algn="ctr"/>
+            <a:endParaRPr lang="en-US"/>
+          </a:p>
+        </p:txBody>
+      </p:sp>
+      <p:sp>
+        <p:nvSpPr>
+          <p:cNvPr id="16" name="Rectangle 15">
+            <a:hlinkClick r:id="rId3" action="ppaction://hlinksldjump"/>
+            <a:extLst>
+              <a:ext uri="{FF2B5EF4-FFF2-40B4-BE49-F238E27FC236}">
+                <a16:creationId xmlns:a16="http://schemas.microsoft.com/office/drawing/2014/main" id="{71AC2D43-AB9A-34B3-1A0C-1E900F9DF8A2}"/>
+              </a:ext>
+            </a:extLst>
+          </p:cNvPr>
+          <p:cNvSpPr/>
+          <p:nvPr/>
+        </p:nvSpPr>
+        <p:spPr>
+          <a:xfrm>
+            <a:off x="4814595" y="5980922"/>
+            <a:ext cx="2146041" cy="466531"/>
+          </a:xfrm>
+          <a:prstGeom prst="rect">
+            <a:avLst/>
+          </a:prstGeom>
+          <a:scene3d>
+            <a:camera prst="orthographicFront"/>
+            <a:lightRig rig="threePt" dir="t"/>
+          </a:scene3d>
+          <a:sp3d>
+            <a:bevelT/>
+          </a:sp3d>
+        </p:spPr>
+        <p:style>
+          <a:lnRef idx="2">
+            <a:schemeClr val="accent1">
+              <a:shade val="50000"/>
+            </a:schemeClr>
+          </a:lnRef>
+          <a:fillRef idx="1">
+            <a:schemeClr val="accent1"/>
+          </a:fillRef>
+          <a:effectRef idx="0">
+            <a:schemeClr val="accent1"/>
+          </a:effectRef>
+          <a:fontRef idx="minor">
+            <a:schemeClr val="lt1"/>
+          </a:fontRef>
+        </p:style>
+        <p:txBody>
+          <a:bodyPr rtlCol="0" anchor="ctr"/>
+          <a:lstStyle/>
+          <a:p>
+            <a:pPr algn="ctr"/>
+            <a:r>
+              <a:rPr lang="en-US" dirty="0"/>
+              <a:t>Add Plant</a:t>
+            </a:r>
+          </a:p>
+        </p:txBody>
+      </p:sp>
+    </p:spTree>
+    <p:extLst>
+      <p:ext uri="{BB962C8B-B14F-4D97-AF65-F5344CB8AC3E}">
+        <p14:creationId xmlns:p14="http://schemas.microsoft.com/office/powerpoint/2010/main" val="3809588198"/>
+      </p:ext>
+    </p:extLst>
+  </p:cSld>
+  <p:clrMapOvr>
+    <a:masterClrMapping/>
+  </p:clrMapOvr>
+  <p:extLst>
+    <p:ext uri="{6950BFC3-D8DA-4A85-94F7-54DA5524770B}">
+      <p188:commentRel xmlns:p188="http://schemas.microsoft.com/office/powerpoint/2018/8/main" r:id="rId2"/>
+    </p:ext>
+  </p:extLst>
 </p:sld>
 </file>
 

</xml_diff>

<commit_message>
Updated the wireframe to take make it easier to create mobile app.
</commit_message>
<xml_diff>
--- a/Protyping of website.pptx
+++ b/Protyping of website.pptx
@@ -331,7 +331,7 @@
           <a:p>
             <a:fld id="{349DEDEE-9A7E-450C-BBEC-328772541CDE}" type="datetimeFigureOut">
               <a:rPr lang="en-US" smtClean="0"/>
-              <a:t>6/24/2022</a:t>
+              <a:t>5/6/2025</a:t>
             </a:fld>
             <a:endParaRPr lang="en-US"/>
           </a:p>
@@ -529,7 +529,7 @@
           <a:p>
             <a:fld id="{349DEDEE-9A7E-450C-BBEC-328772541CDE}" type="datetimeFigureOut">
               <a:rPr lang="en-US" smtClean="0"/>
-              <a:t>6/24/2022</a:t>
+              <a:t>5/6/2025</a:t>
             </a:fld>
             <a:endParaRPr lang="en-US"/>
           </a:p>
@@ -737,7 +737,7 @@
           <a:p>
             <a:fld id="{349DEDEE-9A7E-450C-BBEC-328772541CDE}" type="datetimeFigureOut">
               <a:rPr lang="en-US" smtClean="0"/>
-              <a:t>6/24/2022</a:t>
+              <a:t>5/6/2025</a:t>
             </a:fld>
             <a:endParaRPr lang="en-US"/>
           </a:p>
@@ -935,7 +935,7 @@
           <a:p>
             <a:fld id="{349DEDEE-9A7E-450C-BBEC-328772541CDE}" type="datetimeFigureOut">
               <a:rPr lang="en-US" smtClean="0"/>
-              <a:t>6/24/2022</a:t>
+              <a:t>5/6/2025</a:t>
             </a:fld>
             <a:endParaRPr lang="en-US"/>
           </a:p>
@@ -1210,7 +1210,7 @@
           <a:p>
             <a:fld id="{349DEDEE-9A7E-450C-BBEC-328772541CDE}" type="datetimeFigureOut">
               <a:rPr lang="en-US" smtClean="0"/>
-              <a:t>6/24/2022</a:t>
+              <a:t>5/6/2025</a:t>
             </a:fld>
             <a:endParaRPr lang="en-US"/>
           </a:p>
@@ -1475,7 +1475,7 @@
           <a:p>
             <a:fld id="{349DEDEE-9A7E-450C-BBEC-328772541CDE}" type="datetimeFigureOut">
               <a:rPr lang="en-US" smtClean="0"/>
-              <a:t>6/24/2022</a:t>
+              <a:t>5/6/2025</a:t>
             </a:fld>
             <a:endParaRPr lang="en-US"/>
           </a:p>
@@ -1887,7 +1887,7 @@
           <a:p>
             <a:fld id="{349DEDEE-9A7E-450C-BBEC-328772541CDE}" type="datetimeFigureOut">
               <a:rPr lang="en-US" smtClean="0"/>
-              <a:t>6/24/2022</a:t>
+              <a:t>5/6/2025</a:t>
             </a:fld>
             <a:endParaRPr lang="en-US"/>
           </a:p>
@@ -2028,7 +2028,7 @@
           <a:p>
             <a:fld id="{349DEDEE-9A7E-450C-BBEC-328772541CDE}" type="datetimeFigureOut">
               <a:rPr lang="en-US" smtClean="0"/>
-              <a:t>6/24/2022</a:t>
+              <a:t>5/6/2025</a:t>
             </a:fld>
             <a:endParaRPr lang="en-US"/>
           </a:p>
@@ -2141,7 +2141,7 @@
           <a:p>
             <a:fld id="{349DEDEE-9A7E-450C-BBEC-328772541CDE}" type="datetimeFigureOut">
               <a:rPr lang="en-US" smtClean="0"/>
-              <a:t>6/24/2022</a:t>
+              <a:t>5/6/2025</a:t>
             </a:fld>
             <a:endParaRPr lang="en-US"/>
           </a:p>
@@ -2452,7 +2452,7 @@
           <a:p>
             <a:fld id="{349DEDEE-9A7E-450C-BBEC-328772541CDE}" type="datetimeFigureOut">
               <a:rPr lang="en-US" smtClean="0"/>
-              <a:t>6/24/2022</a:t>
+              <a:t>5/6/2025</a:t>
             </a:fld>
             <a:endParaRPr lang="en-US"/>
           </a:p>
@@ -2740,7 +2740,7 @@
           <a:p>
             <a:fld id="{349DEDEE-9A7E-450C-BBEC-328772541CDE}" type="datetimeFigureOut">
               <a:rPr lang="en-US" smtClean="0"/>
-              <a:t>6/24/2022</a:t>
+              <a:t>5/6/2025</a:t>
             </a:fld>
             <a:endParaRPr lang="en-US"/>
           </a:p>
@@ -2981,7 +2981,7 @@
           <a:p>
             <a:fld id="{349DEDEE-9A7E-450C-BBEC-328772541CDE}" type="datetimeFigureOut">
               <a:rPr lang="en-US" smtClean="0"/>
-              <a:t>6/24/2022</a:t>
+              <a:t>5/6/2025</a:t>
             </a:fld>
             <a:endParaRPr lang="en-US"/>
           </a:p>
@@ -3400,42 +3400,6 @@
       </p:grpSpPr>
       <p:sp>
         <p:nvSpPr>
-          <p:cNvPr id="4" name="TextBox 3">
-            <a:extLst>
-              <a:ext uri="{FF2B5EF4-FFF2-40B4-BE49-F238E27FC236}">
-                <a16:creationId xmlns:a16="http://schemas.microsoft.com/office/drawing/2014/main" id="{959F4C1C-DFAB-4285-BFD0-0F4547AB49F1}"/>
-              </a:ext>
-            </a:extLst>
-          </p:cNvPr>
-          <p:cNvSpPr txBox="1"/>
-          <p:nvPr/>
-        </p:nvSpPr>
-        <p:spPr>
-          <a:xfrm>
-            <a:off x="2335763" y="688519"/>
-            <a:ext cx="7520473" cy="369332"/>
-          </a:xfrm>
-          <a:prstGeom prst="rect">
-            <a:avLst/>
-          </a:prstGeom>
-          <a:noFill/>
-        </p:spPr>
-        <p:txBody>
-          <a:bodyPr wrap="square" rtlCol="0">
-            <a:spAutoFit/>
-          </a:bodyPr>
-          <a:lstStyle/>
-          <a:p>
-            <a:pPr algn="ctr"/>
-            <a:r>
-              <a:rPr lang="en-US" dirty="0"/>
-              <a:t>Plant Waterer Server</a:t>
-            </a:r>
-          </a:p>
-        </p:txBody>
-      </p:sp>
-      <p:sp>
-        <p:nvSpPr>
           <p:cNvPr id="5" name="Rectangle 4">
             <a:extLst>
               <a:ext uri="{FF2B5EF4-FFF2-40B4-BE49-F238E27FC236}">
@@ -3497,7 +3461,7 @@
         </p:nvSpPr>
         <p:spPr>
           <a:xfrm>
-            <a:off x="4785048" y="1548883"/>
+            <a:off x="5548099" y="1548883"/>
             <a:ext cx="2621902" cy="4058816"/>
           </a:xfrm>
           <a:prstGeom prst="rect">
@@ -3940,7 +3904,7 @@
         </p:nvGrpSpPr>
         <p:grpSpPr>
           <a:xfrm>
-            <a:off x="5695949" y="3034719"/>
+            <a:off x="6459000" y="3034719"/>
             <a:ext cx="800100" cy="787981"/>
             <a:chOff x="5695949" y="3034719"/>
             <a:chExt cx="800100" cy="787981"/>
@@ -4106,6 +4070,116 @@
           </a:p>
         </p:txBody>
       </p:sp>
+      <p:cxnSp>
+        <p:nvCxnSpPr>
+          <p:cNvPr id="21" name="Straight Arrow Connector 20">
+            <a:extLst>
+              <a:ext uri="{FF2B5EF4-FFF2-40B4-BE49-F238E27FC236}">
+                <a16:creationId xmlns:a16="http://schemas.microsoft.com/office/drawing/2014/main" id="{17721801-DB4E-4D0D-4709-A976CCE48E18}"/>
+              </a:ext>
+            </a:extLst>
+          </p:cNvPr>
+          <p:cNvCxnSpPr/>
+          <p:nvPr/>
+        </p:nvCxnSpPr>
+        <p:spPr>
+          <a:xfrm>
+            <a:off x="3825815" y="3307702"/>
+            <a:ext cx="1519796" cy="0"/>
+          </a:xfrm>
+          <a:prstGeom prst="straightConnector1">
+            <a:avLst/>
+          </a:prstGeom>
+          <a:ln>
+            <a:headEnd type="triangle"/>
+            <a:tailEnd type="triangle"/>
+          </a:ln>
+        </p:spPr>
+        <p:style>
+          <a:lnRef idx="1">
+            <a:schemeClr val="accent1"/>
+          </a:lnRef>
+          <a:fillRef idx="0">
+            <a:schemeClr val="accent1"/>
+          </a:fillRef>
+          <a:effectRef idx="0">
+            <a:schemeClr val="accent1"/>
+          </a:effectRef>
+          <a:fontRef idx="minor">
+            <a:schemeClr val="tx1"/>
+          </a:fontRef>
+        </p:style>
+      </p:cxnSp>
+      <p:sp>
+        <p:nvSpPr>
+          <p:cNvPr id="24" name="TextBox 23">
+            <a:extLst>
+              <a:ext uri="{FF2B5EF4-FFF2-40B4-BE49-F238E27FC236}">
+                <a16:creationId xmlns:a16="http://schemas.microsoft.com/office/drawing/2014/main" id="{63A110FD-530D-FC80-A216-D334C70D8CAD}"/>
+              </a:ext>
+            </a:extLst>
+          </p:cNvPr>
+          <p:cNvSpPr txBox="1"/>
+          <p:nvPr/>
+        </p:nvSpPr>
+        <p:spPr>
+          <a:xfrm>
+            <a:off x="3909848" y="3714356"/>
+            <a:ext cx="1435763" cy="923330"/>
+          </a:xfrm>
+          <a:prstGeom prst="rect">
+            <a:avLst/>
+          </a:prstGeom>
+          <a:noFill/>
+        </p:spPr>
+        <p:txBody>
+          <a:bodyPr wrap="square" rtlCol="0">
+            <a:spAutoFit/>
+          </a:bodyPr>
+          <a:lstStyle/>
+          <a:p>
+            <a:r>
+              <a:rPr lang="en-US" dirty="0"/>
+              <a:t>Swipe between Views</a:t>
+            </a:r>
+          </a:p>
+        </p:txBody>
+      </p:sp>
+      <p:sp>
+        <p:nvSpPr>
+          <p:cNvPr id="25" name="TextBox 24">
+            <a:extLst>
+              <a:ext uri="{FF2B5EF4-FFF2-40B4-BE49-F238E27FC236}">
+                <a16:creationId xmlns:a16="http://schemas.microsoft.com/office/drawing/2014/main" id="{AFB8FAAE-66C9-C5AB-B61D-7C90DB2B1A60}"/>
+              </a:ext>
+            </a:extLst>
+          </p:cNvPr>
+          <p:cNvSpPr txBox="1"/>
+          <p:nvPr/>
+        </p:nvSpPr>
+        <p:spPr>
+          <a:xfrm>
+            <a:off x="6291836" y="3958915"/>
+            <a:ext cx="1134428" cy="369332"/>
+          </a:xfrm>
+          <a:prstGeom prst="rect">
+            <a:avLst/>
+          </a:prstGeom>
+          <a:noFill/>
+        </p:spPr>
+        <p:txBody>
+          <a:bodyPr wrap="square" rtlCol="0">
+            <a:spAutoFit/>
+          </a:bodyPr>
+          <a:lstStyle/>
+          <a:p>
+            <a:r>
+              <a:rPr lang="en-US" dirty="0"/>
+              <a:t>Add Plant</a:t>
+            </a:r>
+          </a:p>
+        </p:txBody>
+      </p:sp>
     </p:spTree>
     <p:extLst>
       <p:ext uri="{BB962C8B-B14F-4D97-AF65-F5344CB8AC3E}">
@@ -5192,66 +5266,6 @@
       </p:pic>
       <p:sp>
         <p:nvSpPr>
-          <p:cNvPr id="28" name="Rectangle 27">
-            <a:hlinkClick r:id="rId4" action="ppaction://hlinksldjump"/>
-            <a:extLst>
-              <a:ext uri="{FF2B5EF4-FFF2-40B4-BE49-F238E27FC236}">
-                <a16:creationId xmlns:a16="http://schemas.microsoft.com/office/drawing/2014/main" id="{FD682DDE-4049-E728-B6B8-C5CCC4A761E1}"/>
-              </a:ext>
-            </a:extLst>
-          </p:cNvPr>
-          <p:cNvSpPr/>
-          <p:nvPr/>
-        </p:nvSpPr>
-        <p:spPr>
-          <a:xfrm>
-            <a:off x="5015748" y="5710739"/>
-            <a:ext cx="1741401" cy="526774"/>
-          </a:xfrm>
-          <a:prstGeom prst="rect">
-            <a:avLst/>
-          </a:prstGeom>
-          <a:solidFill>
-            <a:schemeClr val="accent1"/>
-          </a:solidFill>
-          <a:scene3d>
-            <a:camera prst="orthographicFront"/>
-            <a:lightRig rig="threePt" dir="t"/>
-          </a:scene3d>
-          <a:sp3d>
-            <a:bevelT w="165100" prst="coolSlant"/>
-          </a:sp3d>
-        </p:spPr>
-        <p:style>
-          <a:lnRef idx="2">
-            <a:schemeClr val="accent1">
-              <a:shade val="50000"/>
-            </a:schemeClr>
-          </a:lnRef>
-          <a:fillRef idx="1">
-            <a:schemeClr val="accent1"/>
-          </a:fillRef>
-          <a:effectRef idx="0">
-            <a:schemeClr val="accent1"/>
-          </a:effectRef>
-          <a:fontRef idx="minor">
-            <a:schemeClr val="lt1"/>
-          </a:fontRef>
-        </p:style>
-        <p:txBody>
-          <a:bodyPr rtlCol="0" anchor="ctr"/>
-          <a:lstStyle/>
-          <a:p>
-            <a:pPr algn="ctr"/>
-            <a:r>
-              <a:rPr lang="en-US" dirty="0"/>
-              <a:t>Back</a:t>
-            </a:r>
-          </a:p>
-        </p:txBody>
-      </p:sp>
-      <p:sp>
-        <p:nvSpPr>
           <p:cNvPr id="29" name="Rectangle 28">
             <a:extLst>
               <a:ext uri="{FF2B5EF4-FFF2-40B4-BE49-F238E27FC236}">
@@ -5313,6 +5327,86 @@
           </a:p>
         </p:txBody>
       </p:sp>
+      <p:cxnSp>
+        <p:nvCxnSpPr>
+          <p:cNvPr id="21" name="Straight Arrow Connector 20">
+            <a:extLst>
+              <a:ext uri="{FF2B5EF4-FFF2-40B4-BE49-F238E27FC236}">
+                <a16:creationId xmlns:a16="http://schemas.microsoft.com/office/drawing/2014/main" id="{9485EB2A-1F80-794E-59EB-8EBCF70F9C4F}"/>
+              </a:ext>
+            </a:extLst>
+          </p:cNvPr>
+          <p:cNvCxnSpPr/>
+          <p:nvPr/>
+        </p:nvCxnSpPr>
+        <p:spPr>
+          <a:xfrm>
+            <a:off x="3561347" y="2653823"/>
+            <a:ext cx="522515" cy="0"/>
+          </a:xfrm>
+          <a:prstGeom prst="straightConnector1">
+            <a:avLst/>
+          </a:prstGeom>
+          <a:ln>
+            <a:headEnd type="triangle"/>
+            <a:tailEnd type="triangle"/>
+          </a:ln>
+        </p:spPr>
+        <p:style>
+          <a:lnRef idx="1">
+            <a:schemeClr val="accent1"/>
+          </a:lnRef>
+          <a:fillRef idx="0">
+            <a:schemeClr val="accent1"/>
+          </a:fillRef>
+          <a:effectRef idx="0">
+            <a:schemeClr val="accent1"/>
+          </a:effectRef>
+          <a:fontRef idx="minor">
+            <a:schemeClr val="tx1"/>
+          </a:fontRef>
+        </p:style>
+      </p:cxnSp>
+      <p:cxnSp>
+        <p:nvCxnSpPr>
+          <p:cNvPr id="31" name="Straight Arrow Connector 30">
+            <a:extLst>
+              <a:ext uri="{FF2B5EF4-FFF2-40B4-BE49-F238E27FC236}">
+                <a16:creationId xmlns:a16="http://schemas.microsoft.com/office/drawing/2014/main" id="{851A4DE4-702D-B1DC-FE49-ABE499B4E8B6}"/>
+              </a:ext>
+            </a:extLst>
+          </p:cNvPr>
+          <p:cNvCxnSpPr/>
+          <p:nvPr/>
+        </p:nvCxnSpPr>
+        <p:spPr>
+          <a:xfrm>
+            <a:off x="7610833" y="2626322"/>
+            <a:ext cx="481263" cy="0"/>
+          </a:xfrm>
+          <a:prstGeom prst="straightConnector1">
+            <a:avLst/>
+          </a:prstGeom>
+          <a:ln>
+            <a:headEnd type="triangle"/>
+            <a:tailEnd type="triangle"/>
+          </a:ln>
+        </p:spPr>
+        <p:style>
+          <a:lnRef idx="1">
+            <a:schemeClr val="accent1"/>
+          </a:lnRef>
+          <a:fillRef idx="0">
+            <a:schemeClr val="accent1"/>
+          </a:fillRef>
+          <a:effectRef idx="0">
+            <a:schemeClr val="accent1"/>
+          </a:effectRef>
+          <a:fontRef idx="minor">
+            <a:schemeClr val="tx1"/>
+          </a:fontRef>
+        </p:style>
+      </p:cxnSp>
     </p:spTree>
     <p:extLst>
       <p:ext uri="{BB962C8B-B14F-4D97-AF65-F5344CB8AC3E}">
@@ -7239,7 +7333,7 @@
           <a:p>
             <a:r>
               <a:rPr lang="en-US" dirty="0"/>
-              <a:t>Date:</a:t>
+              <a:t>Date Planted:</a:t>
             </a:r>
           </a:p>
         </p:txBody>

</xml_diff>